<commit_message>
Revision reporte de monitoreo 141215
</commit_message>
<xml_diff>
--- a/Proyectos/2015/Métricas y monitoreo/Reporte_monitoreo_151214.pptx
+++ b/Proyectos/2015/Métricas y monitoreo/Reporte_monitoreo_151214.pptx
@@ -25,7 +25,7 @@
 </p:presentation>
 </file>
 
-<file path=ppt/charts/chart1.xml><?xml version="1.0" encoding="utf-8"?>
+<file path=ppt/charts/chart5.xml><?xml version="1.0" encoding="utf-8"?>
 <c:chartSpace xmlns:c="http://schemas.openxmlformats.org/drawingml/2006/chart" xmlns:a="http://schemas.openxmlformats.org/drawingml/2006/main" xmlns:r="http://schemas.openxmlformats.org/officeDocument/2006/relationships">
   <c:lang val="en-US"/>
   <c:chart>
@@ -102,11 +102,11 @@
         </c:ser>
         <c:gapWidth val="150"/>
         <c:overlap val="0"/>
-        <c:axId val="71422758"/>
-        <c:axId val="35529398"/>
+        <c:axId val="54448357"/>
+        <c:axId val="23811457"/>
       </c:barChart>
       <c:catAx>
-        <c:axId val="71422758"/>
+        <c:axId val="54448357"/>
         <c:scaling>
           <c:orientation val="minMax"/>
         </c:scaling>
@@ -123,14 +123,14 @@
             <a:round/>
           </a:ln>
         </c:spPr>
-        <c:crossAx val="35529398"/>
+        <c:crossAx val="23811457"/>
         <c:crosses val="autoZero"/>
         <c:auto val="1"/>
         <c:lblAlgn val="ctr"/>
         <c:lblOffset val="100"/>
       </c:catAx>
       <c:valAx>
-        <c:axId val="35529398"/>
+        <c:axId val="23811457"/>
         <c:scaling>
           <c:orientation val="minMax"/>
           <c:max val="1"/>
@@ -158,7 +158,7 @@
             <a:round/>
           </a:ln>
         </c:spPr>
-        <c:crossAx val="71422758"/>
+        <c:crossAx val="54448357"/>
         <c:crosses val="autoZero"/>
       </c:valAx>
       <c:dTable>
@@ -188,7 +188,7 @@
 </c:chartSpace>
 </file>
 
-<file path=ppt/charts/chart2.xml><?xml version="1.0" encoding="utf-8"?>
+<file path=ppt/charts/chart6.xml><?xml version="1.0" encoding="utf-8"?>
 <c:chartSpace xmlns:c="http://schemas.openxmlformats.org/drawingml/2006/chart" xmlns:a="http://schemas.openxmlformats.org/drawingml/2006/main" xmlns:r="http://schemas.openxmlformats.org/officeDocument/2006/relationships">
   <c:lang val="en-US"/>
   <c:chart>
@@ -265,11 +265,11 @@
         </c:ser>
         <c:gapWidth val="150"/>
         <c:overlap val="0"/>
-        <c:axId val="81762148"/>
-        <c:axId val="32923419"/>
+        <c:axId val="95662661"/>
+        <c:axId val="49982944"/>
       </c:barChart>
       <c:catAx>
-        <c:axId val="81762148"/>
+        <c:axId val="95662661"/>
         <c:scaling>
           <c:orientation val="minMax"/>
         </c:scaling>
@@ -286,14 +286,14 @@
             <a:round/>
           </a:ln>
         </c:spPr>
-        <c:crossAx val="32923419"/>
+        <c:crossAx val="49982944"/>
         <c:crosses val="autoZero"/>
         <c:auto val="1"/>
         <c:lblAlgn val="ctr"/>
         <c:lblOffset val="100"/>
       </c:catAx>
       <c:valAx>
-        <c:axId val="32923419"/>
+        <c:axId val="49982944"/>
         <c:scaling>
           <c:orientation val="minMax"/>
           <c:max val="1"/>
@@ -321,7 +321,7 @@
             <a:round/>
           </a:ln>
         </c:spPr>
-        <c:crossAx val="81762148"/>
+        <c:crossAx val="95662661"/>
         <c:crosses val="autoZero"/>
       </c:valAx>
       <c:dTable>
@@ -351,7 +351,7 @@
 </c:chartSpace>
 </file>
 
-<file path=ppt/charts/chart3.xml><?xml version="1.0" encoding="utf-8"?>
+<file path=ppt/charts/chart7.xml><?xml version="1.0" encoding="utf-8"?>
 <c:chartSpace xmlns:c="http://schemas.openxmlformats.org/drawingml/2006/chart" xmlns:a="http://schemas.openxmlformats.org/drawingml/2006/main" xmlns:r="http://schemas.openxmlformats.org/officeDocument/2006/relationships">
   <c:lang val="en-US"/>
   <c:chart>
@@ -440,11 +440,11 @@
         </c:ser>
         <c:gapWidth val="150"/>
         <c:overlap val="0"/>
-        <c:axId val="44216020"/>
-        <c:axId val="13949922"/>
+        <c:axId val="88807224"/>
+        <c:axId val="81031469"/>
       </c:barChart>
       <c:catAx>
-        <c:axId val="44216020"/>
+        <c:axId val="88807224"/>
         <c:scaling>
           <c:orientation val="minMax"/>
         </c:scaling>
@@ -461,14 +461,14 @@
             <a:round/>
           </a:ln>
         </c:spPr>
-        <c:crossAx val="13949922"/>
+        <c:crossAx val="81031469"/>
         <c:crosses val="autoZero"/>
         <c:auto val="1"/>
         <c:lblAlgn val="ctr"/>
         <c:lblOffset val="100"/>
       </c:catAx>
       <c:valAx>
-        <c:axId val="13949922"/>
+        <c:axId val="81031469"/>
         <c:scaling>
           <c:orientation val="minMax"/>
           <c:max val="1"/>
@@ -496,7 +496,7 @@
             <a:round/>
           </a:ln>
         </c:spPr>
-        <c:crossAx val="44216020"/>
+        <c:crossAx val="88807224"/>
         <c:crosses val="autoZero"/>
       </c:valAx>
       <c:dTable>
@@ -526,7 +526,7 @@
 </c:chartSpace>
 </file>
 
-<file path=ppt/charts/chart4.xml><?xml version="1.0" encoding="utf-8"?>
+<file path=ppt/charts/chart8.xml><?xml version="1.0" encoding="utf-8"?>
 <c:chartSpace xmlns:c="http://schemas.openxmlformats.org/drawingml/2006/chart" xmlns:a="http://schemas.openxmlformats.org/drawingml/2006/main" xmlns:r="http://schemas.openxmlformats.org/officeDocument/2006/relationships">
   <c:lang val="en-US"/>
   <c:chart>
@@ -638,11 +638,11 @@
         </c:ser>
         <c:gapWidth val="150"/>
         <c:overlap val="0"/>
-        <c:axId val="84313614"/>
-        <c:axId val="44967745"/>
+        <c:axId val="92693659"/>
+        <c:axId val="82953138"/>
       </c:barChart>
       <c:catAx>
-        <c:axId val="84313614"/>
+        <c:axId val="92693659"/>
         <c:scaling>
           <c:orientation val="minMax"/>
         </c:scaling>
@@ -659,14 +659,14 @@
             <a:round/>
           </a:ln>
         </c:spPr>
-        <c:crossAx val="44967745"/>
+        <c:crossAx val="82953138"/>
         <c:crosses val="autoZero"/>
         <c:auto val="1"/>
         <c:lblAlgn val="ctr"/>
         <c:lblOffset val="100"/>
       </c:catAx>
       <c:valAx>
-        <c:axId val="44967745"/>
+        <c:axId val="82953138"/>
         <c:scaling>
           <c:orientation val="minMax"/>
         </c:scaling>
@@ -693,7 +693,7 @@
             <a:round/>
           </a:ln>
         </c:spPr>
-        <c:crossAx val="84313614"/>
+        <c:crossAx val="92693659"/>
         <c:crosses val="autoZero"/>
       </c:valAx>
       <c:spPr>
@@ -780,7 +780,7 @@
         <p:spPr>
           <a:xfrm>
             <a:off x="457200" y="273600"/>
-            <a:ext cx="8228880" cy="1144440"/>
+            <a:ext cx="8228520" cy="1144080"/>
           </a:xfrm>
           <a:prstGeom prst="rect">
             <a:avLst/>
@@ -807,7 +807,7 @@
         <p:spPr>
           <a:xfrm>
             <a:off x="457200" y="1604520"/>
-            <a:ext cx="8228880" cy="1896840"/>
+            <a:ext cx="8228520" cy="1896480"/>
           </a:xfrm>
           <a:prstGeom prst="rect">
             <a:avLst/>
@@ -832,8 +832,8 @@
         </p:nvSpPr>
         <p:spPr>
           <a:xfrm>
-            <a:off x="457200" y="3682080"/>
-            <a:ext cx="8228880" cy="1896840"/>
+            <a:off x="457200" y="3681720"/>
+            <a:ext cx="8228520" cy="1896480"/>
           </a:xfrm>
           <a:prstGeom prst="rect">
             <a:avLst/>
@@ -881,7 +881,7 @@
         <p:spPr>
           <a:xfrm>
             <a:off x="457200" y="273600"/>
-            <a:ext cx="8228880" cy="1144440"/>
+            <a:ext cx="8228520" cy="1144080"/>
           </a:xfrm>
           <a:prstGeom prst="rect">
             <a:avLst/>
@@ -908,7 +908,7 @@
         <p:spPr>
           <a:xfrm>
             <a:off x="457200" y="1604520"/>
-            <a:ext cx="4015440" cy="1896840"/>
+            <a:ext cx="4015440" cy="1896480"/>
           </a:xfrm>
           <a:prstGeom prst="rect">
             <a:avLst/>
@@ -934,7 +934,7 @@
         <p:spPr>
           <a:xfrm>
             <a:off x="4673880" y="1604520"/>
-            <a:ext cx="4015440" cy="1896840"/>
+            <a:ext cx="4015440" cy="1896480"/>
           </a:xfrm>
           <a:prstGeom prst="rect">
             <a:avLst/>
@@ -959,8 +959,8 @@
         </p:nvSpPr>
         <p:spPr>
           <a:xfrm>
-            <a:off x="4673880" y="3682080"/>
-            <a:ext cx="4015440" cy="1896840"/>
+            <a:off x="4673880" y="3681720"/>
+            <a:ext cx="4015440" cy="1896480"/>
           </a:xfrm>
           <a:prstGeom prst="rect">
             <a:avLst/>
@@ -985,8 +985,8 @@
         </p:nvSpPr>
         <p:spPr>
           <a:xfrm>
-            <a:off x="457200" y="3682080"/>
-            <a:ext cx="4015440" cy="1896840"/>
+            <a:off x="457200" y="3681720"/>
+            <a:ext cx="4015440" cy="1896480"/>
           </a:xfrm>
           <a:prstGeom prst="rect">
             <a:avLst/>
@@ -1034,7 +1034,7 @@
         <p:spPr>
           <a:xfrm>
             <a:off x="457200" y="273600"/>
-            <a:ext cx="8228880" cy="1144440"/>
+            <a:ext cx="8228520" cy="1144080"/>
           </a:xfrm>
           <a:prstGeom prst="rect">
             <a:avLst/>
@@ -1061,7 +1061,7 @@
         <p:spPr>
           <a:xfrm>
             <a:off x="457200" y="1604520"/>
-            <a:ext cx="8228880" cy="3976920"/>
+            <a:ext cx="8228520" cy="3976560"/>
           </a:xfrm>
           <a:prstGeom prst="rect">
             <a:avLst/>
@@ -1087,7 +1087,7 @@
         <p:spPr>
           <a:xfrm>
             <a:off x="457200" y="1604520"/>
-            <a:ext cx="8228880" cy="3976920"/>
+            <a:ext cx="8228520" cy="3976560"/>
           </a:xfrm>
           <a:prstGeom prst="rect">
             <a:avLst/>
@@ -1112,8 +1112,8 @@
         </p:blipFill>
         <p:spPr>
           <a:xfrm>
-            <a:off x="2079360" y="1604160"/>
-            <a:ext cx="4984200" cy="3976920"/>
+            <a:off x="2079360" y="1604520"/>
+            <a:ext cx="4983840" cy="3976560"/>
           </a:xfrm>
           <a:prstGeom prst="rect">
             <a:avLst/>
@@ -1135,8 +1135,8 @@
         </p:blipFill>
         <p:spPr>
           <a:xfrm>
-            <a:off x="2079360" y="1604160"/>
-            <a:ext cx="4984200" cy="3976920"/>
+            <a:off x="2079360" y="1604520"/>
+            <a:ext cx="4983840" cy="3976560"/>
           </a:xfrm>
           <a:prstGeom prst="rect">
             <a:avLst/>
@@ -1192,7 +1192,7 @@
       </p:grpSpPr>
       <p:sp>
         <p:nvSpPr>
-          <p:cNvPr id="43" name="PlaceHolder 1"/>
+          <p:cNvPr id="42" name="PlaceHolder 1"/>
           <p:cNvSpPr>
             <a:spLocks noGrp="1"/>
           </p:cNvSpPr>
@@ -1203,7 +1203,7 @@
         <p:spPr>
           <a:xfrm>
             <a:off x="457200" y="273600"/>
-            <a:ext cx="8228880" cy="1144440"/>
+            <a:ext cx="8228520" cy="1144080"/>
           </a:xfrm>
           <a:prstGeom prst="rect">
             <a:avLst/>
@@ -1219,7 +1219,7 @@
       </p:sp>
       <p:sp>
         <p:nvSpPr>
-          <p:cNvPr id="44" name="PlaceHolder 2"/>
+          <p:cNvPr id="43" name="PlaceHolder 2"/>
           <p:cNvSpPr>
             <a:spLocks noGrp="1"/>
           </p:cNvSpPr>
@@ -1230,7 +1230,7 @@
         <p:spPr>
           <a:xfrm>
             <a:off x="457200" y="1604520"/>
-            <a:ext cx="8228880" cy="3976920"/>
+            <a:ext cx="8228520" cy="3976560"/>
           </a:xfrm>
           <a:prstGeom prst="rect">
             <a:avLst/>
@@ -1268,7 +1268,7 @@
       </p:grpSpPr>
       <p:sp>
         <p:nvSpPr>
-          <p:cNvPr id="45" name="PlaceHolder 1"/>
+          <p:cNvPr id="44" name="PlaceHolder 1"/>
           <p:cNvSpPr>
             <a:spLocks noGrp="1"/>
           </p:cNvSpPr>
@@ -1279,7 +1279,7 @@
         <p:spPr>
           <a:xfrm>
             <a:off x="457200" y="273600"/>
-            <a:ext cx="8228880" cy="1144440"/>
+            <a:ext cx="8228520" cy="1144080"/>
           </a:xfrm>
           <a:prstGeom prst="rect">
             <a:avLst/>
@@ -1295,7 +1295,7 @@
       </p:sp>
       <p:sp>
         <p:nvSpPr>
-          <p:cNvPr id="46" name="PlaceHolder 2"/>
+          <p:cNvPr id="45" name="PlaceHolder 2"/>
           <p:cNvSpPr>
             <a:spLocks noGrp="1"/>
           </p:cNvSpPr>
@@ -1306,7 +1306,7 @@
         <p:spPr>
           <a:xfrm>
             <a:off x="457200" y="1604520"/>
-            <a:ext cx="8228880" cy="3976920"/>
+            <a:ext cx="8228520" cy="3976560"/>
           </a:xfrm>
           <a:prstGeom prst="rect">
             <a:avLst/>
@@ -1343,7 +1343,7 @@
       </p:grpSpPr>
       <p:sp>
         <p:nvSpPr>
-          <p:cNvPr id="47" name="PlaceHolder 1"/>
+          <p:cNvPr id="46" name="PlaceHolder 1"/>
           <p:cNvSpPr>
             <a:spLocks noGrp="1"/>
           </p:cNvSpPr>
@@ -1354,7 +1354,7 @@
         <p:spPr>
           <a:xfrm>
             <a:off x="457200" y="273600"/>
-            <a:ext cx="8228880" cy="1144440"/>
+            <a:ext cx="8228520" cy="1144080"/>
           </a:xfrm>
           <a:prstGeom prst="rect">
             <a:avLst/>
@@ -1370,7 +1370,7 @@
       </p:sp>
       <p:sp>
         <p:nvSpPr>
-          <p:cNvPr id="48" name="PlaceHolder 2"/>
+          <p:cNvPr id="47" name="PlaceHolder 2"/>
           <p:cNvSpPr>
             <a:spLocks noGrp="1"/>
           </p:cNvSpPr>
@@ -1381,7 +1381,7 @@
         <p:spPr>
           <a:xfrm>
             <a:off x="457200" y="1604520"/>
-            <a:ext cx="4015440" cy="3976920"/>
+            <a:ext cx="4015440" cy="3976560"/>
           </a:xfrm>
           <a:prstGeom prst="rect">
             <a:avLst/>
@@ -1396,7 +1396,7 @@
       </p:sp>
       <p:sp>
         <p:nvSpPr>
-          <p:cNvPr id="49" name="PlaceHolder 3"/>
+          <p:cNvPr id="48" name="PlaceHolder 3"/>
           <p:cNvSpPr>
             <a:spLocks noGrp="1"/>
           </p:cNvSpPr>
@@ -1407,7 +1407,7 @@
         <p:spPr>
           <a:xfrm>
             <a:off x="4673880" y="1604520"/>
-            <a:ext cx="4015440" cy="3976920"/>
+            <a:ext cx="4015440" cy="3976560"/>
           </a:xfrm>
           <a:prstGeom prst="rect">
             <a:avLst/>
@@ -1444,7 +1444,7 @@
       </p:grpSpPr>
       <p:sp>
         <p:nvSpPr>
-          <p:cNvPr id="50" name="PlaceHolder 1"/>
+          <p:cNvPr id="49" name="PlaceHolder 1"/>
           <p:cNvSpPr>
             <a:spLocks noGrp="1"/>
           </p:cNvSpPr>
@@ -1455,7 +1455,7 @@
         <p:spPr>
           <a:xfrm>
             <a:off x="457200" y="273600"/>
-            <a:ext cx="8228880" cy="1144440"/>
+            <a:ext cx="8228520" cy="1144080"/>
           </a:xfrm>
           <a:prstGeom prst="rect">
             <a:avLst/>
@@ -1493,7 +1493,7 @@
       </p:grpSpPr>
       <p:sp>
         <p:nvSpPr>
-          <p:cNvPr id="51" name="PlaceHolder 1"/>
+          <p:cNvPr id="50" name="PlaceHolder 1"/>
           <p:cNvSpPr>
             <a:spLocks noGrp="1"/>
           </p:cNvSpPr>
@@ -1504,7 +1504,7 @@
         <p:spPr>
           <a:xfrm>
             <a:off x="457200" y="273600"/>
-            <a:ext cx="8228880" cy="5306400"/>
+            <a:ext cx="8228520" cy="5304600"/>
           </a:xfrm>
           <a:prstGeom prst="rect">
             <a:avLst/>
@@ -1542,7 +1542,7 @@
       </p:grpSpPr>
       <p:sp>
         <p:nvSpPr>
-          <p:cNvPr id="52" name="PlaceHolder 1"/>
+          <p:cNvPr id="51" name="PlaceHolder 1"/>
           <p:cNvSpPr>
             <a:spLocks noGrp="1"/>
           </p:cNvSpPr>
@@ -1553,7 +1553,7 @@
         <p:spPr>
           <a:xfrm>
             <a:off x="457200" y="273600"/>
-            <a:ext cx="8228880" cy="1144440"/>
+            <a:ext cx="8228520" cy="1144080"/>
           </a:xfrm>
           <a:prstGeom prst="rect">
             <a:avLst/>
@@ -1569,7 +1569,7 @@
       </p:sp>
       <p:sp>
         <p:nvSpPr>
-          <p:cNvPr id="53" name="PlaceHolder 2"/>
+          <p:cNvPr id="52" name="PlaceHolder 2"/>
           <p:cNvSpPr>
             <a:spLocks noGrp="1"/>
           </p:cNvSpPr>
@@ -1580,7 +1580,7 @@
         <p:spPr>
           <a:xfrm>
             <a:off x="457200" y="1604520"/>
-            <a:ext cx="4015440" cy="1896840"/>
+            <a:ext cx="4015440" cy="1896480"/>
           </a:xfrm>
           <a:prstGeom prst="rect">
             <a:avLst/>
@@ -1595,7 +1595,7 @@
       </p:sp>
       <p:sp>
         <p:nvSpPr>
-          <p:cNvPr id="54" name="PlaceHolder 3"/>
+          <p:cNvPr id="53" name="PlaceHolder 3"/>
           <p:cNvSpPr>
             <a:spLocks noGrp="1"/>
           </p:cNvSpPr>
@@ -1605,8 +1605,8 @@
         </p:nvSpPr>
         <p:spPr>
           <a:xfrm>
-            <a:off x="457200" y="3682080"/>
-            <a:ext cx="4015440" cy="1896840"/>
+            <a:off x="457200" y="3681720"/>
+            <a:ext cx="4015440" cy="1896480"/>
           </a:xfrm>
           <a:prstGeom prst="rect">
             <a:avLst/>
@@ -1621,7 +1621,7 @@
       </p:sp>
       <p:sp>
         <p:nvSpPr>
-          <p:cNvPr id="55" name="PlaceHolder 4"/>
+          <p:cNvPr id="54" name="PlaceHolder 4"/>
           <p:cNvSpPr>
             <a:spLocks noGrp="1"/>
           </p:cNvSpPr>
@@ -1632,7 +1632,7 @@
         <p:spPr>
           <a:xfrm>
             <a:off x="4673880" y="1604520"/>
-            <a:ext cx="4015440" cy="3976920"/>
+            <a:ext cx="4015440" cy="3976560"/>
           </a:xfrm>
           <a:prstGeom prst="rect">
             <a:avLst/>
@@ -1680,7 +1680,7 @@
         <p:spPr>
           <a:xfrm>
             <a:off x="457200" y="273600"/>
-            <a:ext cx="8228880" cy="1144440"/>
+            <a:ext cx="8228520" cy="1144080"/>
           </a:xfrm>
           <a:prstGeom prst="rect">
             <a:avLst/>
@@ -1707,7 +1707,7 @@
         <p:spPr>
           <a:xfrm>
             <a:off x="457200" y="1604520"/>
-            <a:ext cx="8228880" cy="3976920"/>
+            <a:ext cx="8228520" cy="3976560"/>
           </a:xfrm>
           <a:prstGeom prst="rect">
             <a:avLst/>
@@ -1745,7 +1745,7 @@
       </p:grpSpPr>
       <p:sp>
         <p:nvSpPr>
-          <p:cNvPr id="56" name="PlaceHolder 1"/>
+          <p:cNvPr id="55" name="PlaceHolder 1"/>
           <p:cNvSpPr>
             <a:spLocks noGrp="1"/>
           </p:cNvSpPr>
@@ -1756,7 +1756,7 @@
         <p:spPr>
           <a:xfrm>
             <a:off x="457200" y="273600"/>
-            <a:ext cx="8228880" cy="1144440"/>
+            <a:ext cx="8228520" cy="1144080"/>
           </a:xfrm>
           <a:prstGeom prst="rect">
             <a:avLst/>
@@ -1772,7 +1772,7 @@
       </p:sp>
       <p:sp>
         <p:nvSpPr>
-          <p:cNvPr id="57" name="PlaceHolder 2"/>
+          <p:cNvPr id="56" name="PlaceHolder 2"/>
           <p:cNvSpPr>
             <a:spLocks noGrp="1"/>
           </p:cNvSpPr>
@@ -1783,7 +1783,7 @@
         <p:spPr>
           <a:xfrm>
             <a:off x="457200" y="1604520"/>
-            <a:ext cx="4015440" cy="3976920"/>
+            <a:ext cx="4015440" cy="3976560"/>
           </a:xfrm>
           <a:prstGeom prst="rect">
             <a:avLst/>
@@ -1798,7 +1798,7 @@
       </p:sp>
       <p:sp>
         <p:nvSpPr>
-          <p:cNvPr id="58" name="PlaceHolder 3"/>
+          <p:cNvPr id="57" name="PlaceHolder 3"/>
           <p:cNvSpPr>
             <a:spLocks noGrp="1"/>
           </p:cNvSpPr>
@@ -1809,7 +1809,7 @@
         <p:spPr>
           <a:xfrm>
             <a:off x="4673880" y="1604520"/>
-            <a:ext cx="4015440" cy="1896840"/>
+            <a:ext cx="4015440" cy="1896480"/>
           </a:xfrm>
           <a:prstGeom prst="rect">
             <a:avLst/>
@@ -1824,7 +1824,7 @@
       </p:sp>
       <p:sp>
         <p:nvSpPr>
-          <p:cNvPr id="59" name="PlaceHolder 4"/>
+          <p:cNvPr id="58" name="PlaceHolder 4"/>
           <p:cNvSpPr>
             <a:spLocks noGrp="1"/>
           </p:cNvSpPr>
@@ -1834,8 +1834,8 @@
         </p:nvSpPr>
         <p:spPr>
           <a:xfrm>
-            <a:off x="4673880" y="3682080"/>
-            <a:ext cx="4015440" cy="1896840"/>
+            <a:off x="4673880" y="3681720"/>
+            <a:ext cx="4015440" cy="1896480"/>
           </a:xfrm>
           <a:prstGeom prst="rect">
             <a:avLst/>
@@ -1872,7 +1872,7 @@
       </p:grpSpPr>
       <p:sp>
         <p:nvSpPr>
-          <p:cNvPr id="60" name="PlaceHolder 1"/>
+          <p:cNvPr id="59" name="PlaceHolder 1"/>
           <p:cNvSpPr>
             <a:spLocks noGrp="1"/>
           </p:cNvSpPr>
@@ -1883,7 +1883,7 @@
         <p:spPr>
           <a:xfrm>
             <a:off x="457200" y="273600"/>
-            <a:ext cx="8228880" cy="1144440"/>
+            <a:ext cx="8228520" cy="1144080"/>
           </a:xfrm>
           <a:prstGeom prst="rect">
             <a:avLst/>
@@ -1899,7 +1899,7 @@
       </p:sp>
       <p:sp>
         <p:nvSpPr>
-          <p:cNvPr id="61" name="PlaceHolder 2"/>
+          <p:cNvPr id="60" name="PlaceHolder 2"/>
           <p:cNvSpPr>
             <a:spLocks noGrp="1"/>
           </p:cNvSpPr>
@@ -1910,7 +1910,7 @@
         <p:spPr>
           <a:xfrm>
             <a:off x="457200" y="1604520"/>
-            <a:ext cx="4015440" cy="1896840"/>
+            <a:ext cx="4015440" cy="1896480"/>
           </a:xfrm>
           <a:prstGeom prst="rect">
             <a:avLst/>
@@ -1925,7 +1925,7 @@
       </p:sp>
       <p:sp>
         <p:nvSpPr>
-          <p:cNvPr id="62" name="PlaceHolder 3"/>
+          <p:cNvPr id="61" name="PlaceHolder 3"/>
           <p:cNvSpPr>
             <a:spLocks noGrp="1"/>
           </p:cNvSpPr>
@@ -1936,7 +1936,7 @@
         <p:spPr>
           <a:xfrm>
             <a:off x="4673880" y="1604520"/>
-            <a:ext cx="4015440" cy="1896840"/>
+            <a:ext cx="4015440" cy="1896480"/>
           </a:xfrm>
           <a:prstGeom prst="rect">
             <a:avLst/>
@@ -1951,7 +1951,7 @@
       </p:sp>
       <p:sp>
         <p:nvSpPr>
-          <p:cNvPr id="63" name="PlaceHolder 4"/>
+          <p:cNvPr id="62" name="PlaceHolder 4"/>
           <p:cNvSpPr>
             <a:spLocks noGrp="1"/>
           </p:cNvSpPr>
@@ -1961,8 +1961,8 @@
         </p:nvSpPr>
         <p:spPr>
           <a:xfrm>
-            <a:off x="457200" y="3682080"/>
-            <a:ext cx="8228880" cy="1896840"/>
+            <a:off x="457200" y="3681720"/>
+            <a:ext cx="8228520" cy="1896480"/>
           </a:xfrm>
           <a:prstGeom prst="rect">
             <a:avLst/>
@@ -1999,7 +1999,7 @@
       </p:grpSpPr>
       <p:sp>
         <p:nvSpPr>
-          <p:cNvPr id="64" name="PlaceHolder 1"/>
+          <p:cNvPr id="63" name="PlaceHolder 1"/>
           <p:cNvSpPr>
             <a:spLocks noGrp="1"/>
           </p:cNvSpPr>
@@ -2010,7 +2010,7 @@
         <p:spPr>
           <a:xfrm>
             <a:off x="457200" y="273600"/>
-            <a:ext cx="8228880" cy="1144440"/>
+            <a:ext cx="8228520" cy="1144080"/>
           </a:xfrm>
           <a:prstGeom prst="rect">
             <a:avLst/>
@@ -2026,7 +2026,7 @@
       </p:sp>
       <p:sp>
         <p:nvSpPr>
-          <p:cNvPr id="65" name="PlaceHolder 2"/>
+          <p:cNvPr id="64" name="PlaceHolder 2"/>
           <p:cNvSpPr>
             <a:spLocks noGrp="1"/>
           </p:cNvSpPr>
@@ -2037,7 +2037,7 @@
         <p:spPr>
           <a:xfrm>
             <a:off x="457200" y="1604520"/>
-            <a:ext cx="8228880" cy="1896840"/>
+            <a:ext cx="8228520" cy="1896480"/>
           </a:xfrm>
           <a:prstGeom prst="rect">
             <a:avLst/>
@@ -2052,7 +2052,7 @@
       </p:sp>
       <p:sp>
         <p:nvSpPr>
-          <p:cNvPr id="66" name="PlaceHolder 3"/>
+          <p:cNvPr id="65" name="PlaceHolder 3"/>
           <p:cNvSpPr>
             <a:spLocks noGrp="1"/>
           </p:cNvSpPr>
@@ -2062,8 +2062,8 @@
         </p:nvSpPr>
         <p:spPr>
           <a:xfrm>
-            <a:off x="457200" y="3682080"/>
-            <a:ext cx="8228880" cy="1896840"/>
+            <a:off x="457200" y="3681720"/>
+            <a:ext cx="8228520" cy="1896480"/>
           </a:xfrm>
           <a:prstGeom prst="rect">
             <a:avLst/>
@@ -2100,7 +2100,7 @@
       </p:grpSpPr>
       <p:sp>
         <p:nvSpPr>
-          <p:cNvPr id="67" name="PlaceHolder 1"/>
+          <p:cNvPr id="66" name="PlaceHolder 1"/>
           <p:cNvSpPr>
             <a:spLocks noGrp="1"/>
           </p:cNvSpPr>
@@ -2111,7 +2111,7 @@
         <p:spPr>
           <a:xfrm>
             <a:off x="457200" y="273600"/>
-            <a:ext cx="8228880" cy="1144440"/>
+            <a:ext cx="8228520" cy="1144080"/>
           </a:xfrm>
           <a:prstGeom prst="rect">
             <a:avLst/>
@@ -2127,7 +2127,7 @@
       </p:sp>
       <p:sp>
         <p:nvSpPr>
-          <p:cNvPr id="68" name="PlaceHolder 2"/>
+          <p:cNvPr id="67" name="PlaceHolder 2"/>
           <p:cNvSpPr>
             <a:spLocks noGrp="1"/>
           </p:cNvSpPr>
@@ -2138,7 +2138,7 @@
         <p:spPr>
           <a:xfrm>
             <a:off x="457200" y="1604520"/>
-            <a:ext cx="4015440" cy="1896840"/>
+            <a:ext cx="4015440" cy="1896480"/>
           </a:xfrm>
           <a:prstGeom prst="rect">
             <a:avLst/>
@@ -2153,7 +2153,7 @@
       </p:sp>
       <p:sp>
         <p:nvSpPr>
-          <p:cNvPr id="69" name="PlaceHolder 3"/>
+          <p:cNvPr id="68" name="PlaceHolder 3"/>
           <p:cNvSpPr>
             <a:spLocks noGrp="1"/>
           </p:cNvSpPr>
@@ -2164,7 +2164,7 @@
         <p:spPr>
           <a:xfrm>
             <a:off x="4673880" y="1604520"/>
-            <a:ext cx="4015440" cy="1896840"/>
+            <a:ext cx="4015440" cy="1896480"/>
           </a:xfrm>
           <a:prstGeom prst="rect">
             <a:avLst/>
@@ -2179,7 +2179,7 @@
       </p:sp>
       <p:sp>
         <p:nvSpPr>
-          <p:cNvPr id="70" name="PlaceHolder 4"/>
+          <p:cNvPr id="69" name="PlaceHolder 4"/>
           <p:cNvSpPr>
             <a:spLocks noGrp="1"/>
           </p:cNvSpPr>
@@ -2189,8 +2189,8 @@
         </p:nvSpPr>
         <p:spPr>
           <a:xfrm>
-            <a:off x="4673880" y="3682080"/>
-            <a:ext cx="4015440" cy="1896840"/>
+            <a:off x="4673880" y="3681720"/>
+            <a:ext cx="4015440" cy="1896480"/>
           </a:xfrm>
           <a:prstGeom prst="rect">
             <a:avLst/>
@@ -2205,7 +2205,7 @@
       </p:sp>
       <p:sp>
         <p:nvSpPr>
-          <p:cNvPr id="71" name="PlaceHolder 5"/>
+          <p:cNvPr id="70" name="PlaceHolder 5"/>
           <p:cNvSpPr>
             <a:spLocks noGrp="1"/>
           </p:cNvSpPr>
@@ -2215,8 +2215,8 @@
         </p:nvSpPr>
         <p:spPr>
           <a:xfrm>
-            <a:off x="457200" y="3682080"/>
-            <a:ext cx="4015440" cy="1896840"/>
+            <a:off x="457200" y="3681720"/>
+            <a:ext cx="4015440" cy="1896480"/>
           </a:xfrm>
           <a:prstGeom prst="rect">
             <a:avLst/>
@@ -2253,7 +2253,7 @@
       </p:grpSpPr>
       <p:sp>
         <p:nvSpPr>
-          <p:cNvPr id="72" name="PlaceHolder 1"/>
+          <p:cNvPr id="71" name="PlaceHolder 1"/>
           <p:cNvSpPr>
             <a:spLocks noGrp="1"/>
           </p:cNvSpPr>
@@ -2264,7 +2264,7 @@
         <p:spPr>
           <a:xfrm>
             <a:off x="457200" y="273600"/>
-            <a:ext cx="8228880" cy="1144440"/>
+            <a:ext cx="8228520" cy="1144080"/>
           </a:xfrm>
           <a:prstGeom prst="rect">
             <a:avLst/>
@@ -2280,7 +2280,7 @@
       </p:sp>
       <p:sp>
         <p:nvSpPr>
-          <p:cNvPr id="73" name="PlaceHolder 2"/>
+          <p:cNvPr id="72" name="PlaceHolder 2"/>
           <p:cNvSpPr>
             <a:spLocks noGrp="1"/>
           </p:cNvSpPr>
@@ -2291,7 +2291,7 @@
         <p:spPr>
           <a:xfrm>
             <a:off x="457200" y="1604520"/>
-            <a:ext cx="8228880" cy="3976920"/>
+            <a:ext cx="8228520" cy="3976560"/>
           </a:xfrm>
           <a:prstGeom prst="rect">
             <a:avLst/>
@@ -2306,7 +2306,7 @@
       </p:sp>
       <p:sp>
         <p:nvSpPr>
-          <p:cNvPr id="74" name="PlaceHolder 3"/>
+          <p:cNvPr id="73" name="PlaceHolder 3"/>
           <p:cNvSpPr>
             <a:spLocks noGrp="1"/>
           </p:cNvSpPr>
@@ -2317,7 +2317,7 @@
         <p:spPr>
           <a:xfrm>
             <a:off x="457200" y="1604520"/>
-            <a:ext cx="8228880" cy="3976920"/>
+            <a:ext cx="8228520" cy="3976560"/>
           </a:xfrm>
           <a:prstGeom prst="rect">
             <a:avLst/>
@@ -2330,6 +2330,29 @@
           </a:p>
         </p:txBody>
       </p:sp>
+      <p:pic>
+        <p:nvPicPr>
+          <p:cNvPr id="74" name="" descr=""/>
+          <p:cNvPicPr/>
+          <p:nvPr/>
+        </p:nvPicPr>
+        <p:blipFill>
+          <a:blip r:embed="rId2"/>
+          <a:stretch/>
+        </p:blipFill>
+        <p:spPr>
+          <a:xfrm>
+            <a:off x="2079360" y="1604520"/>
+            <a:ext cx="4983840" cy="3976560"/>
+          </a:xfrm>
+          <a:prstGeom prst="rect">
+            <a:avLst/>
+          </a:prstGeom>
+          <a:ln>
+            <a:noFill/>
+          </a:ln>
+        </p:spPr>
+      </p:pic>
       <p:pic>
         <p:nvPicPr>
           <p:cNvPr id="75" name="" descr=""/>
@@ -2337,36 +2360,13 @@
           <p:nvPr/>
         </p:nvPicPr>
         <p:blipFill>
-          <a:blip r:embed="rId2"/>
-          <a:stretch/>
-        </p:blipFill>
-        <p:spPr>
-          <a:xfrm>
-            <a:off x="2079360" y="1604160"/>
-            <a:ext cx="4984200" cy="3976920"/>
-          </a:xfrm>
-          <a:prstGeom prst="rect">
-            <a:avLst/>
-          </a:prstGeom>
-          <a:ln>
-            <a:noFill/>
-          </a:ln>
-        </p:spPr>
-      </p:pic>
-      <p:pic>
-        <p:nvPicPr>
-          <p:cNvPr id="76" name="" descr=""/>
-          <p:cNvPicPr/>
-          <p:nvPr/>
-        </p:nvPicPr>
-        <p:blipFill>
           <a:blip r:embed="rId3"/>
           <a:stretch/>
         </p:blipFill>
         <p:spPr>
           <a:xfrm>
-            <a:off x="2079360" y="1604160"/>
-            <a:ext cx="4984200" cy="3976920"/>
+            <a:off x="2079360" y="1604520"/>
+            <a:ext cx="4983840" cy="3976560"/>
           </a:xfrm>
           <a:prstGeom prst="rect">
             <a:avLst/>
@@ -2411,7 +2411,7 @@
         <p:spPr>
           <a:xfrm>
             <a:off x="457200" y="273600"/>
-            <a:ext cx="8228880" cy="1144440"/>
+            <a:ext cx="8228520" cy="1144080"/>
           </a:xfrm>
           <a:prstGeom prst="rect">
             <a:avLst/>
@@ -2438,7 +2438,7 @@
         <p:spPr>
           <a:xfrm>
             <a:off x="457200" y="1604520"/>
-            <a:ext cx="8228880" cy="3976920"/>
+            <a:ext cx="8228520" cy="3976560"/>
           </a:xfrm>
           <a:prstGeom prst="rect">
             <a:avLst/>
@@ -2486,7 +2486,7 @@
         <p:spPr>
           <a:xfrm>
             <a:off x="457200" y="273600"/>
-            <a:ext cx="8228880" cy="1144440"/>
+            <a:ext cx="8228520" cy="1144080"/>
           </a:xfrm>
           <a:prstGeom prst="rect">
             <a:avLst/>
@@ -2513,7 +2513,7 @@
         <p:spPr>
           <a:xfrm>
             <a:off x="457200" y="1604520"/>
-            <a:ext cx="4015440" cy="3976920"/>
+            <a:ext cx="4015440" cy="3976560"/>
           </a:xfrm>
           <a:prstGeom prst="rect">
             <a:avLst/>
@@ -2539,7 +2539,7 @@
         <p:spPr>
           <a:xfrm>
             <a:off x="4673880" y="1604520"/>
-            <a:ext cx="4015440" cy="3976920"/>
+            <a:ext cx="4015440" cy="3976560"/>
           </a:xfrm>
           <a:prstGeom prst="rect">
             <a:avLst/>
@@ -2587,7 +2587,7 @@
         <p:spPr>
           <a:xfrm>
             <a:off x="457200" y="273600"/>
-            <a:ext cx="8228880" cy="1144440"/>
+            <a:ext cx="8228520" cy="1144080"/>
           </a:xfrm>
           <a:prstGeom prst="rect">
             <a:avLst/>
@@ -2636,7 +2636,7 @@
         <p:spPr>
           <a:xfrm>
             <a:off x="457200" y="273600"/>
-            <a:ext cx="8228880" cy="5306400"/>
+            <a:ext cx="8228520" cy="5304600"/>
           </a:xfrm>
           <a:prstGeom prst="rect">
             <a:avLst/>
@@ -2685,7 +2685,7 @@
         <p:spPr>
           <a:xfrm>
             <a:off x="457200" y="273600"/>
-            <a:ext cx="8228880" cy="1144440"/>
+            <a:ext cx="8228520" cy="1144080"/>
           </a:xfrm>
           <a:prstGeom prst="rect">
             <a:avLst/>
@@ -2712,7 +2712,7 @@
         <p:spPr>
           <a:xfrm>
             <a:off x="457200" y="1604520"/>
-            <a:ext cx="4015440" cy="1896840"/>
+            <a:ext cx="4015440" cy="1896480"/>
           </a:xfrm>
           <a:prstGeom prst="rect">
             <a:avLst/>
@@ -2737,8 +2737,8 @@
         </p:nvSpPr>
         <p:spPr>
           <a:xfrm>
-            <a:off x="457200" y="3682080"/>
-            <a:ext cx="4015440" cy="1896840"/>
+            <a:off x="457200" y="3681720"/>
+            <a:ext cx="4015440" cy="1896480"/>
           </a:xfrm>
           <a:prstGeom prst="rect">
             <a:avLst/>
@@ -2764,7 +2764,7 @@
         <p:spPr>
           <a:xfrm>
             <a:off x="4673880" y="1604520"/>
-            <a:ext cx="4015440" cy="3976920"/>
+            <a:ext cx="4015440" cy="3976560"/>
           </a:xfrm>
           <a:prstGeom prst="rect">
             <a:avLst/>
@@ -2812,7 +2812,7 @@
         <p:spPr>
           <a:xfrm>
             <a:off x="457200" y="273600"/>
-            <a:ext cx="8228880" cy="1144440"/>
+            <a:ext cx="8228520" cy="1144080"/>
           </a:xfrm>
           <a:prstGeom prst="rect">
             <a:avLst/>
@@ -2839,7 +2839,7 @@
         <p:spPr>
           <a:xfrm>
             <a:off x="457200" y="1604520"/>
-            <a:ext cx="4015440" cy="3976920"/>
+            <a:ext cx="4015440" cy="3976560"/>
           </a:xfrm>
           <a:prstGeom prst="rect">
             <a:avLst/>
@@ -2865,7 +2865,7 @@
         <p:spPr>
           <a:xfrm>
             <a:off x="4673880" y="1604520"/>
-            <a:ext cx="4015440" cy="1896840"/>
+            <a:ext cx="4015440" cy="1896480"/>
           </a:xfrm>
           <a:prstGeom prst="rect">
             <a:avLst/>
@@ -2890,8 +2890,8 @@
         </p:nvSpPr>
         <p:spPr>
           <a:xfrm>
-            <a:off x="4673880" y="3682080"/>
-            <a:ext cx="4015440" cy="1896840"/>
+            <a:off x="4673880" y="3681720"/>
+            <a:ext cx="4015440" cy="1896480"/>
           </a:xfrm>
           <a:prstGeom prst="rect">
             <a:avLst/>
@@ -2939,7 +2939,7 @@
         <p:spPr>
           <a:xfrm>
             <a:off x="457200" y="273600"/>
-            <a:ext cx="8228880" cy="1144440"/>
+            <a:ext cx="8228520" cy="1144080"/>
           </a:xfrm>
           <a:prstGeom prst="rect">
             <a:avLst/>
@@ -2966,7 +2966,7 @@
         <p:spPr>
           <a:xfrm>
             <a:off x="457200" y="1604520"/>
-            <a:ext cx="4015440" cy="1896840"/>
+            <a:ext cx="4015440" cy="1896480"/>
           </a:xfrm>
           <a:prstGeom prst="rect">
             <a:avLst/>
@@ -2992,7 +2992,7 @@
         <p:spPr>
           <a:xfrm>
             <a:off x="4673880" y="1604520"/>
-            <a:ext cx="4015440" cy="1896840"/>
+            <a:ext cx="4015440" cy="1896480"/>
           </a:xfrm>
           <a:prstGeom prst="rect">
             <a:avLst/>
@@ -3017,8 +3017,8 @@
         </p:nvSpPr>
         <p:spPr>
           <a:xfrm>
-            <a:off x="457200" y="3682080"/>
-            <a:ext cx="8228880" cy="1896840"/>
+            <a:off x="457200" y="3681720"/>
+            <a:ext cx="8228520" cy="1896480"/>
           </a:xfrm>
           <a:prstGeom prst="rect">
             <a:avLst/>
@@ -3072,7 +3072,7 @@
         <p:spPr>
           <a:xfrm>
             <a:off x="777240" y="0"/>
-            <a:ext cx="7541280" cy="378360"/>
+            <a:ext cx="7540920" cy="378000"/>
           </a:xfrm>
           <a:prstGeom prst="rect">
             <a:avLst/>
@@ -3105,7 +3105,7 @@
         <p:spPr>
           <a:xfrm>
             <a:off x="777240" y="6172200"/>
-            <a:ext cx="7541280" cy="24840"/>
+            <a:ext cx="7540920" cy="24480"/>
           </a:xfrm>
           <a:prstGeom prst="rect">
             <a:avLst/>
@@ -3339,7 +3339,7 @@
         <p:spPr>
           <a:xfrm>
             <a:off x="777240" y="0"/>
-            <a:ext cx="7541280" cy="378360"/>
+            <a:ext cx="7540920" cy="378000"/>
           </a:xfrm>
           <a:prstGeom prst="rect">
             <a:avLst/>
@@ -3372,7 +3372,7 @@
         <p:spPr>
           <a:xfrm>
             <a:off x="777240" y="6172200"/>
-            <a:ext cx="7541280" cy="24840"/>
+            <a:ext cx="7540920" cy="24480"/>
           </a:xfrm>
           <a:prstGeom prst="rect">
             <a:avLst/>
@@ -3409,7 +3409,7 @@
         <p:spPr>
           <a:xfrm>
             <a:off x="457200" y="273600"/>
-            <a:ext cx="8228880" cy="1144440"/>
+            <a:ext cx="8228520" cy="1144080"/>
           </a:xfrm>
           <a:prstGeom prst="rect">
             <a:avLst/>
@@ -3426,33 +3426,6 @@
       <p:sp>
         <p:nvSpPr>
           <p:cNvPr id="41" name="PlaceHolder 4"/>
-          <p:cNvSpPr>
-            <a:spLocks noGrp="1"/>
-          </p:cNvSpPr>
-          <p:nvPr>
-            <p:ph type="subTitle"/>
-          </p:nvPr>
-        </p:nvSpPr>
-        <p:spPr>
-          <a:xfrm>
-            <a:off x="457200" y="1604520"/>
-            <a:ext cx="8228880" cy="3976920"/>
-          </a:xfrm>
-          <a:prstGeom prst="rect">
-            <a:avLst/>
-          </a:prstGeom>
-        </p:spPr>
-        <p:txBody>
-          <a:bodyPr lIns="0" rIns="0" tIns="0" bIns="0" anchor="ctr"/>
-          <a:p>
-            <a:pPr algn="ctr"/>
-            <a:endParaRPr/>
-          </a:p>
-        </p:txBody>
-      </p:sp>
-      <p:sp>
-        <p:nvSpPr>
-          <p:cNvPr id="42" name="PlaceHolder 5"/>
           <p:cNvSpPr>
             <a:spLocks noGrp="1"/>
           </p:cNvSpPr>
@@ -3463,7 +3436,7 @@
         <p:spPr>
           <a:xfrm>
             <a:off x="457200" y="1604520"/>
-            <a:ext cx="8229240" cy="3977280"/>
+            <a:ext cx="8228520" cy="3976560"/>
           </a:xfrm>
           <a:prstGeom prst="rect">
             <a:avLst/>
@@ -3478,7 +3451,7 @@
               <a:buChar char=""/>
             </a:pPr>
             <a:r>
-              <a:rPr lang="es-MX" sz="3200">
+              <a:rPr lang="es-MX">
                 <a:latin typeface="Arial"/>
               </a:rPr>
               <a:t>Click to edit the outline text format</a:t>
@@ -3492,7 +3465,7 @@
               <a:buChar char=""/>
             </a:pPr>
             <a:r>
-              <a:rPr lang="es-MX" sz="2800">
+              <a:rPr lang="es-MX">
                 <a:latin typeface="Arial"/>
               </a:rPr>
               <a:t>Second Outline Level</a:t>
@@ -3506,7 +3479,7 @@
               <a:buChar char=""/>
             </a:pPr>
             <a:r>
-              <a:rPr lang="es-MX" sz="2400">
+              <a:rPr lang="es-MX">
                 <a:latin typeface="Arial"/>
               </a:rPr>
               <a:t>Third Outline Level</a:t>
@@ -3520,7 +3493,7 @@
               <a:buChar char=""/>
             </a:pPr>
             <a:r>
-              <a:rPr lang="es-MX" sz="2000">
+              <a:rPr lang="es-MX">
                 <a:latin typeface="Arial"/>
               </a:rPr>
               <a:t>Fourth Outline Level</a:t>
@@ -3534,7 +3507,7 @@
               <a:buChar char=""/>
             </a:pPr>
             <a:r>
-              <a:rPr lang="es-MX" sz="2000">
+              <a:rPr lang="es-MX">
                 <a:latin typeface="Arial"/>
               </a:rPr>
               <a:t>Fifth Outline Level</a:t>
@@ -3548,7 +3521,7 @@
               <a:buChar char=""/>
             </a:pPr>
             <a:r>
-              <a:rPr lang="es-MX" sz="2000">
+              <a:rPr lang="es-MX">
                 <a:latin typeface="Arial"/>
               </a:rPr>
               <a:t>Sixth Outline Level</a:t>
@@ -3562,7 +3535,7 @@
               <a:buChar char=""/>
             </a:pPr>
             <a:r>
-              <a:rPr lang="es-MX" sz="2000">
+              <a:rPr lang="es-MX">
                 <a:latin typeface="Arial"/>
               </a:rPr>
               <a:t>Seventh Outline Level</a:t>
@@ -3610,14 +3583,14 @@
       </p:grpSpPr>
       <p:sp>
         <p:nvSpPr>
-          <p:cNvPr id="77" name="CustomShape 1"/>
+          <p:cNvPr id="76" name="CustomShape 1"/>
           <p:cNvSpPr/>
           <p:nvPr/>
         </p:nvSpPr>
         <p:spPr>
           <a:xfrm>
             <a:off x="1012680" y="2282760"/>
-            <a:ext cx="7768440" cy="1465920"/>
+            <a:ext cx="7768080" cy="1465560"/>
           </a:xfrm>
           <a:prstGeom prst="rect">
             <a:avLst/>
@@ -3636,14 +3609,14 @@
       </p:sp>
       <p:sp>
         <p:nvSpPr>
-          <p:cNvPr id="78" name="CustomShape 2"/>
+          <p:cNvPr id="77" name="CustomShape 2"/>
           <p:cNvSpPr/>
           <p:nvPr/>
         </p:nvSpPr>
         <p:spPr>
           <a:xfrm>
             <a:off x="457200" y="501840"/>
-            <a:ext cx="8030160" cy="1141560"/>
+            <a:ext cx="8029800" cy="1141200"/>
           </a:xfrm>
           <a:prstGeom prst="rect">
             <a:avLst/>
@@ -3683,14 +3656,14 @@
       </p:sp>
       <p:sp>
         <p:nvSpPr>
-          <p:cNvPr id="79" name="CustomShape 3"/>
+          <p:cNvPr id="78" name="CustomShape 3"/>
           <p:cNvSpPr/>
           <p:nvPr/>
         </p:nvSpPr>
         <p:spPr>
           <a:xfrm>
             <a:off x="457200" y="1604520"/>
-            <a:ext cx="3922920" cy="3974040"/>
+            <a:ext cx="3922560" cy="3973680"/>
           </a:xfrm>
           <a:prstGeom prst="rect">
             <a:avLst/>
@@ -3768,7 +3741,7 @@
                 <a:latin typeface="Calibri"/>
                 <a:ea typeface="DejaVu Sans"/>
               </a:rPr>
-              <a:t>Noviembre</a:t>
+              <a:t>Diciembre</a:t>
             </a:r>
             <a:endParaRPr/>
           </a:p>
@@ -3794,7 +3767,7 @@
       </p:sp>
       <p:pic>
         <p:nvPicPr>
-          <p:cNvPr id="80" name="Picture 2" descr=""/>
+          <p:cNvPr id="79" name="Picture 2" descr=""/>
           <p:cNvPicPr/>
           <p:nvPr/>
         </p:nvPicPr>
@@ -3805,7 +3778,7 @@
         <p:spPr>
           <a:xfrm>
             <a:off x="6948360" y="1196640"/>
-            <a:ext cx="1911960" cy="1892880"/>
+            <a:ext cx="1911600" cy="1892520"/>
           </a:xfrm>
           <a:prstGeom prst="rect">
             <a:avLst/>
@@ -3876,14 +3849,14 @@
       </p:grpSpPr>
       <p:sp>
         <p:nvSpPr>
-          <p:cNvPr id="108" name="CustomShape 1"/>
+          <p:cNvPr id="107" name="CustomShape 1"/>
           <p:cNvSpPr/>
           <p:nvPr/>
         </p:nvSpPr>
         <p:spPr>
           <a:xfrm>
             <a:off x="457200" y="274680"/>
-            <a:ext cx="8225640" cy="1139040"/>
+            <a:ext cx="8225280" cy="1138680"/>
           </a:xfrm>
           <a:prstGeom prst="rect">
             <a:avLst/>
@@ -3923,14 +3896,14 @@
       </p:sp>
       <p:sp>
         <p:nvSpPr>
-          <p:cNvPr id="109" name="CustomShape 2"/>
+          <p:cNvPr id="108" name="CustomShape 2"/>
           <p:cNvSpPr/>
           <p:nvPr/>
         </p:nvSpPr>
         <p:spPr>
           <a:xfrm>
             <a:off x="457200" y="1600200"/>
-            <a:ext cx="8225640" cy="4521960"/>
+            <a:ext cx="8225280" cy="4521600"/>
           </a:xfrm>
           <a:prstGeom prst="rect">
             <a:avLst/>
@@ -3949,14 +3922,14 @@
       </p:sp>
       <p:sp>
         <p:nvSpPr>
-          <p:cNvPr id="110" name="CustomShape 3"/>
+          <p:cNvPr id="109" name="CustomShape 3"/>
           <p:cNvSpPr/>
           <p:nvPr/>
         </p:nvSpPr>
         <p:spPr>
           <a:xfrm>
             <a:off x="163080" y="1113480"/>
-            <a:ext cx="8763480" cy="2557080"/>
+            <a:ext cx="8763120" cy="2556720"/>
           </a:xfrm>
           <a:prstGeom prst="rect">
             <a:avLst/>
@@ -4004,7 +3977,7 @@
       </p:sp>
       <p:pic>
         <p:nvPicPr>
-          <p:cNvPr id="111" name="" descr=""/>
+          <p:cNvPr id="110" name="" descr=""/>
           <p:cNvPicPr/>
           <p:nvPr/>
         </p:nvPicPr>
@@ -4015,7 +3988,7 @@
         <p:spPr>
           <a:xfrm>
             <a:off x="8280" y="3214440"/>
-            <a:ext cx="9143280" cy="2689200"/>
+            <a:ext cx="9142920" cy="2688840"/>
           </a:xfrm>
           <a:prstGeom prst="rect">
             <a:avLst/>
@@ -4086,14 +4059,14 @@
       </p:grpSpPr>
       <p:sp>
         <p:nvSpPr>
-          <p:cNvPr id="112" name="CustomShape 1"/>
+          <p:cNvPr id="111" name="CustomShape 1"/>
           <p:cNvSpPr/>
           <p:nvPr/>
         </p:nvSpPr>
         <p:spPr>
           <a:xfrm>
             <a:off x="457200" y="274680"/>
-            <a:ext cx="8225640" cy="1139040"/>
+            <a:ext cx="8225280" cy="1138680"/>
           </a:xfrm>
           <a:prstGeom prst="rect">
             <a:avLst/>
@@ -4133,14 +4106,14 @@
       </p:sp>
       <p:sp>
         <p:nvSpPr>
-          <p:cNvPr id="113" name="CustomShape 2"/>
+          <p:cNvPr id="112" name="CustomShape 2"/>
           <p:cNvSpPr/>
           <p:nvPr/>
         </p:nvSpPr>
         <p:spPr>
           <a:xfrm>
             <a:off x="457200" y="1600200"/>
-            <a:ext cx="8225640" cy="4521960"/>
+            <a:ext cx="8225280" cy="4521600"/>
           </a:xfrm>
           <a:prstGeom prst="rect">
             <a:avLst/>
@@ -4159,14 +4132,14 @@
       </p:sp>
       <p:sp>
         <p:nvSpPr>
-          <p:cNvPr id="114" name="CustomShape 3"/>
+          <p:cNvPr id="113" name="CustomShape 3"/>
           <p:cNvSpPr/>
           <p:nvPr/>
         </p:nvSpPr>
         <p:spPr>
           <a:xfrm>
             <a:off x="6890760" y="1124640"/>
-            <a:ext cx="1851480" cy="3380040"/>
+            <a:ext cx="1851120" cy="3379680"/>
           </a:xfrm>
           <a:prstGeom prst="rect">
             <a:avLst/>
@@ -4214,13 +4187,13 @@
       </p:sp>
       <p:graphicFrame>
         <p:nvGraphicFramePr>
-          <p:cNvPr id="115" name="Table 4"/>
+          <p:cNvPr id="114" name="Table 4"/>
           <p:cNvGraphicFramePr/>
           <p:nvPr/>
         </p:nvGraphicFramePr>
         <p:xfrm>
           <a:off x="217800" y="1127520"/>
-          <a:ext cx="5651640" cy="349560"/>
+          <a:ext cx="6351120" cy="2926440"/>
         </p:xfrm>
         <a:graphic>
           <a:graphicData uri="http://schemas.openxmlformats.org/drawingml/2006/table">
@@ -4486,7 +4459,7 @@
                   <a:tcPr/>
                 </a:tc>
               </a:tr>
-              <a:tr h="859680">
+              <a:tr h="859320">
                 <a:tc>
                   <a:txBody>
                     <a:bodyPr/>
@@ -4575,13 +4548,13 @@
       </p:graphicFrame>
       <p:graphicFrame>
         <p:nvGraphicFramePr>
-          <p:cNvPr id="116" name="Table 5"/>
+          <p:cNvPr id="115" name="Table 5"/>
           <p:cNvGraphicFramePr/>
           <p:nvPr/>
         </p:nvGraphicFramePr>
         <p:xfrm>
           <a:off x="582480" y="4300920"/>
-          <a:ext cx="5753160" cy="343080"/>
+          <a:ext cx="5753160" cy="1638720"/>
         </p:xfrm>
         <a:graphic>
           <a:graphicData uri="http://schemas.openxmlformats.org/drawingml/2006/table">
@@ -4837,14 +4810,14 @@
       </p:grpSpPr>
       <p:sp>
         <p:nvSpPr>
-          <p:cNvPr id="117" name="CustomShape 1"/>
+          <p:cNvPr id="116" name="CustomShape 1"/>
           <p:cNvSpPr/>
           <p:nvPr/>
         </p:nvSpPr>
         <p:spPr>
           <a:xfrm>
             <a:off x="457200" y="274680"/>
-            <a:ext cx="8225640" cy="1139040"/>
+            <a:ext cx="8225280" cy="1138680"/>
           </a:xfrm>
           <a:prstGeom prst="rect">
             <a:avLst/>
@@ -4884,14 +4857,14 @@
       </p:sp>
       <p:sp>
         <p:nvSpPr>
-          <p:cNvPr id="118" name="CustomShape 2"/>
+          <p:cNvPr id="117" name="CustomShape 2"/>
           <p:cNvSpPr/>
           <p:nvPr/>
         </p:nvSpPr>
         <p:spPr>
           <a:xfrm>
             <a:off x="457200" y="1600200"/>
-            <a:ext cx="8225640" cy="4521960"/>
+            <a:ext cx="8225280" cy="4521600"/>
           </a:xfrm>
           <a:prstGeom prst="rect">
             <a:avLst/>
@@ -4910,14 +4883,14 @@
       </p:sp>
       <p:sp>
         <p:nvSpPr>
-          <p:cNvPr id="119" name="CustomShape 3"/>
+          <p:cNvPr id="118" name="CustomShape 3"/>
           <p:cNvSpPr/>
           <p:nvPr/>
         </p:nvSpPr>
         <p:spPr>
           <a:xfrm>
             <a:off x="5751360" y="1412640"/>
-            <a:ext cx="2931480" cy="2282760"/>
+            <a:ext cx="2931120" cy="2282400"/>
           </a:xfrm>
           <a:prstGeom prst="rect">
             <a:avLst/>
@@ -4965,13 +4938,13 @@
       </p:sp>
       <p:graphicFrame>
         <p:nvGraphicFramePr>
-          <p:cNvPr id="120" name=""/>
+          <p:cNvPr id="119" name=""/>
           <p:cNvGraphicFramePr/>
           <p:nvPr/>
         </p:nvGraphicFramePr>
         <p:xfrm>
           <a:off x="720000" y="1576800"/>
-          <a:ext cx="4917600" cy="2742840"/>
+          <a:ext cx="4917240" cy="2742480"/>
         </p:xfrm>
         <a:graphic>
           <a:graphicData uri="http://schemas.openxmlformats.org/drawingml/2006/chart">
@@ -5040,14 +5013,14 @@
       </p:grpSpPr>
       <p:sp>
         <p:nvSpPr>
-          <p:cNvPr id="121" name="CustomShape 1"/>
+          <p:cNvPr id="120" name="CustomShape 1"/>
           <p:cNvSpPr/>
           <p:nvPr/>
         </p:nvSpPr>
         <p:spPr>
           <a:xfrm>
             <a:off x="457200" y="273600"/>
-            <a:ext cx="8228880" cy="1144440"/>
+            <a:ext cx="8228520" cy="1144080"/>
           </a:xfrm>
           <a:prstGeom prst="rect">
             <a:avLst/>
@@ -5073,7 +5046,11 @@
             </a:pPr>
             <a:r>
               <a:rPr lang="es-MX" sz="4400" strike="noStrike">
+                <a:solidFill>
+                  <a:srgbClr val="000000"/>
+                </a:solidFill>
                 <a:latin typeface="Arial"/>
+                <a:ea typeface="DejaVu Sans"/>
               </a:rPr>
               <a:t>Respaldos</a:t>
             </a:r>
@@ -5083,13 +5060,13 @@
       </p:sp>
       <p:graphicFrame>
         <p:nvGraphicFramePr>
-          <p:cNvPr id="122" name="Table 2"/>
+          <p:cNvPr id="121" name="Table 2"/>
           <p:cNvGraphicFramePr/>
           <p:nvPr/>
         </p:nvGraphicFramePr>
         <p:xfrm>
           <a:off x="3007800" y="1833840"/>
-          <a:ext cx="3382920" cy="680040"/>
+          <a:ext cx="3382920" cy="695160"/>
         </p:xfrm>
         <a:graphic>
           <a:graphicData uri="http://schemas.openxmlformats.org/drawingml/2006/table">
@@ -5169,14 +5146,14 @@
       </p:graphicFrame>
       <p:sp>
         <p:nvSpPr>
-          <p:cNvPr id="123" name="CustomShape 3"/>
+          <p:cNvPr id="122" name="CustomShape 3"/>
           <p:cNvSpPr/>
           <p:nvPr/>
         </p:nvSpPr>
         <p:spPr>
           <a:xfrm>
             <a:off x="1152000" y="3960000"/>
-            <a:ext cx="3095640" cy="601920"/>
+            <a:ext cx="3095280" cy="601560"/>
           </a:xfrm>
           <a:prstGeom prst="rect">
             <a:avLst/>
@@ -5197,7 +5174,11 @@
           <a:p>
             <a:r>
               <a:rPr lang="es-MX" strike="noStrike">
+                <a:solidFill>
+                  <a:srgbClr val="000000"/>
+                </a:solidFill>
                 <a:latin typeface="Arial"/>
+                <a:ea typeface="DejaVu Sans"/>
               </a:rPr>
               <a:t>Respaldos realizados el día 11 sin ningún problema.</a:t>
             </a:r>
@@ -5256,14 +5237,14 @@
       </p:grpSpPr>
       <p:sp>
         <p:nvSpPr>
-          <p:cNvPr id="81" name="CustomShape 1"/>
+          <p:cNvPr id="80" name="CustomShape 1"/>
           <p:cNvSpPr/>
           <p:nvPr/>
         </p:nvSpPr>
         <p:spPr>
           <a:xfrm>
             <a:off x="432000" y="12600"/>
-            <a:ext cx="8225640" cy="1139040"/>
+            <a:ext cx="8225280" cy="1138680"/>
           </a:xfrm>
           <a:prstGeom prst="rect">
             <a:avLst/>
@@ -5303,14 +5284,14 @@
       </p:sp>
       <p:sp>
         <p:nvSpPr>
-          <p:cNvPr id="82" name="CustomShape 2"/>
+          <p:cNvPr id="81" name="CustomShape 2"/>
           <p:cNvSpPr/>
           <p:nvPr/>
         </p:nvSpPr>
         <p:spPr>
           <a:xfrm>
             <a:off x="457200" y="1600200"/>
-            <a:ext cx="8225640" cy="4521960"/>
+            <a:ext cx="8225280" cy="4521600"/>
           </a:xfrm>
           <a:prstGeom prst="rect">
             <a:avLst/>
@@ -5329,13 +5310,13 @@
       </p:sp>
       <p:graphicFrame>
         <p:nvGraphicFramePr>
-          <p:cNvPr id="83" name="Table 3"/>
+          <p:cNvPr id="82" name="Table 3"/>
           <p:cNvGraphicFramePr/>
           <p:nvPr/>
         </p:nvGraphicFramePr>
         <p:xfrm>
           <a:off x="1522080" y="830160"/>
-          <a:ext cx="6093720" cy="4421880"/>
+          <a:ext cx="6093720" cy="4879440"/>
         </p:xfrm>
         <a:graphic>
           <a:graphicData uri="http://schemas.openxmlformats.org/drawingml/2006/table">
@@ -5696,7 +5677,7 @@
                         <a:rPr lang="es-MX" sz="1500" strike="noStrike">
                           <a:latin typeface="Times New Roman"/>
                         </a:rPr>
-                        <a:t>P1319 – Cierre</a:t>
+                        <a:t>P1339 – Cierre</a:t>
                       </a:r>
                       <a:endParaRPr/>
                     </a:p>
@@ -6057,14 +6038,14 @@
       </p:grpSpPr>
       <p:sp>
         <p:nvSpPr>
-          <p:cNvPr id="84" name="CustomShape 1"/>
+          <p:cNvPr id="83" name="CustomShape 1"/>
           <p:cNvSpPr/>
           <p:nvPr/>
         </p:nvSpPr>
         <p:spPr>
           <a:xfrm>
             <a:off x="457200" y="274680"/>
-            <a:ext cx="8225640" cy="1139040"/>
+            <a:ext cx="8225280" cy="1138680"/>
           </a:xfrm>
           <a:prstGeom prst="rect">
             <a:avLst/>
@@ -6104,14 +6085,14 @@
       </p:sp>
       <p:sp>
         <p:nvSpPr>
-          <p:cNvPr id="85" name="CustomShape 2"/>
+          <p:cNvPr id="84" name="CustomShape 2"/>
           <p:cNvSpPr/>
           <p:nvPr/>
         </p:nvSpPr>
         <p:spPr>
           <a:xfrm>
             <a:off x="457200" y="1600200"/>
-            <a:ext cx="8225640" cy="4521960"/>
+            <a:ext cx="8225280" cy="4521600"/>
           </a:xfrm>
           <a:prstGeom prst="rect">
             <a:avLst/>
@@ -6149,13 +6130,13 @@
       </p:sp>
       <p:graphicFrame>
         <p:nvGraphicFramePr>
-          <p:cNvPr id="86" name="Table 3"/>
+          <p:cNvPr id="85" name="Table 3"/>
           <p:cNvGraphicFramePr/>
           <p:nvPr/>
         </p:nvGraphicFramePr>
         <p:xfrm>
           <a:off x="36360" y="1579680"/>
-          <a:ext cx="9078120" cy="4463640"/>
+          <a:ext cx="9078120" cy="4463280"/>
         </p:xfrm>
         <a:graphic>
           <a:graphicData uri="http://schemas.openxmlformats.org/drawingml/2006/table">
@@ -6718,7 +6699,7 @@
                   <a:tcPr/>
                 </a:tc>
               </a:tr>
-              <a:tr h="614520">
+              <a:tr h="614160">
                 <a:tc>
                   <a:txBody>
                     <a:bodyPr/>
@@ -6860,14 +6841,14 @@
       </p:grpSpPr>
       <p:sp>
         <p:nvSpPr>
-          <p:cNvPr id="87" name="CustomShape 1"/>
+          <p:cNvPr id="86" name="CustomShape 1"/>
           <p:cNvSpPr/>
           <p:nvPr/>
         </p:nvSpPr>
         <p:spPr>
           <a:xfrm>
             <a:off x="576000" y="1080000"/>
-            <a:ext cx="7990560" cy="600840"/>
+            <a:ext cx="7990200" cy="600480"/>
           </a:xfrm>
           <a:prstGeom prst="rect">
             <a:avLst/>
@@ -6951,14 +6932,14 @@
       </p:grpSpPr>
       <p:sp>
         <p:nvSpPr>
-          <p:cNvPr id="88" name="CustomShape 1"/>
+          <p:cNvPr id="87" name="CustomShape 1"/>
           <p:cNvSpPr/>
           <p:nvPr/>
         </p:nvSpPr>
         <p:spPr>
           <a:xfrm>
             <a:off x="457200" y="274680"/>
-            <a:ext cx="8225640" cy="1139040"/>
+            <a:ext cx="8225280" cy="1138680"/>
           </a:xfrm>
           <a:prstGeom prst="rect">
             <a:avLst/>
@@ -6998,14 +6979,14 @@
       </p:sp>
       <p:sp>
         <p:nvSpPr>
-          <p:cNvPr id="89" name="CustomShape 2"/>
+          <p:cNvPr id="88" name="CustomShape 2"/>
           <p:cNvSpPr/>
           <p:nvPr/>
         </p:nvSpPr>
         <p:spPr>
           <a:xfrm>
             <a:off x="457200" y="1600200"/>
-            <a:ext cx="8225640" cy="4521960"/>
+            <a:ext cx="8225280" cy="4521600"/>
           </a:xfrm>
           <a:prstGeom prst="rect">
             <a:avLst/>
@@ -7024,14 +7005,14 @@
       </p:sp>
       <p:sp>
         <p:nvSpPr>
-          <p:cNvPr id="90" name="CustomShape 3"/>
+          <p:cNvPr id="89" name="CustomShape 3"/>
           <p:cNvSpPr/>
           <p:nvPr/>
         </p:nvSpPr>
         <p:spPr>
           <a:xfrm>
             <a:off x="792000" y="3990240"/>
-            <a:ext cx="7989840" cy="2282760"/>
+            <a:ext cx="7989480" cy="2282400"/>
           </a:xfrm>
           <a:prstGeom prst="rect">
             <a:avLst/>
@@ -7095,13 +7076,13 @@
       </p:sp>
       <p:graphicFrame>
         <p:nvGraphicFramePr>
-          <p:cNvPr id="91" name="Table 4"/>
+          <p:cNvPr id="90" name="Table 4"/>
           <p:cNvGraphicFramePr/>
           <p:nvPr/>
         </p:nvGraphicFramePr>
         <p:xfrm>
           <a:off x="569880" y="1117800"/>
-          <a:ext cx="8286120" cy="2689920"/>
+          <a:ext cx="8285760" cy="2689920"/>
         </p:xfrm>
         <a:graphic>
           <a:graphicData uri="http://schemas.openxmlformats.org/drawingml/2006/table">
@@ -7127,7 +7108,7 @@
                         <a:rPr b="1" lang="es-MX" strike="noStrike">
                           <a:latin typeface="Arial"/>
                         </a:rPr>
-                        <a:t>dic-11</a:t>
+                        <a:t>dic-14</a:t>
                       </a:r>
                       <a:endParaRPr/>
                     </a:p>
@@ -7571,45 +7552,37 @@
                   <a:txBody>
                     <a:bodyPr/>
                     <a:p>
-                      <a:pPr algn="ctr">
-                        <a:lnSpc>
-                          <a:spcPct val="100000"/>
-                        </a:lnSpc>
-                      </a:pPr>
-                      <a:r>
-                        <a:rPr lang="es-MX" strike="noStrike">
+                      <a:pPr algn="ctr"/>
+                      <a:r>
+                        <a:rPr lang="es-MX">
                           <a:latin typeface="Arial"/>
                         </a:rPr>
                         <a:t> </a:t>
                       </a:r>
                       <a:r>
-                        <a:rPr lang="es-MX" strike="noStrike">
-                          <a:latin typeface="Arial"/>
-                        </a:rPr>
-                        <a:t>$29.00 </a:t>
-                      </a:r>
-                      <a:endParaRPr/>
-                    </a:p>
-                  </a:txBody>
-                  <a:tcPr/>
-                </a:tc>
-                <a:tc>
-                  <a:txBody>
-                    <a:bodyPr/>
-                    <a:p>
-                      <a:pPr algn="ctr">
-                        <a:lnSpc>
-                          <a:spcPct val="100000"/>
-                        </a:lnSpc>
-                      </a:pPr>
-                      <a:r>
-                        <a:rPr lang="es-MX" strike="noStrike">
+                        <a:rPr lang="es-MX">
+                          <a:latin typeface="Arial"/>
+                        </a:rPr>
+                        <a:t>$29.16 </a:t>
+                      </a:r>
+                      <a:endParaRPr/>
+                    </a:p>
+                  </a:txBody>
+                  <a:tcPr/>
+                </a:tc>
+                <a:tc>
+                  <a:txBody>
+                    <a:bodyPr/>
+                    <a:p>
+                      <a:pPr algn="ctr"/>
+                      <a:r>
+                        <a:rPr lang="es-MX">
                           <a:latin typeface="Arial"/>
                         </a:rPr>
                         <a:t> </a:t>
                       </a:r>
                       <a:r>
-                        <a:rPr lang="es-MX" strike="noStrike">
+                        <a:rPr lang="es-MX">
                           <a:latin typeface="Arial"/>
                         </a:rPr>
                         <a:t>$45.49 </a:t>
@@ -7623,16 +7596,12 @@
                   <a:txBody>
                     <a:bodyPr/>
                     <a:p>
-                      <a:pPr algn="ctr">
-                        <a:lnSpc>
-                          <a:spcPct val="100000"/>
-                        </a:lnSpc>
-                      </a:pPr>
-                      <a:r>
-                        <a:rPr lang="es-MX" strike="noStrike">
-                          <a:latin typeface="Arial"/>
-                        </a:rPr>
-                        <a:t>-57%</a:t>
+                      <a:pPr algn="ctr"/>
+                      <a:r>
+                        <a:rPr lang="es-MX">
+                          <a:latin typeface="Arial"/>
+                        </a:rPr>
+                        <a:t>-56%</a:t>
                       </a:r>
                       <a:endParaRPr/>
                     </a:p>
@@ -7794,14 +7763,14 @@
       </p:grpSpPr>
       <p:sp>
         <p:nvSpPr>
-          <p:cNvPr id="92" name="CustomShape 1"/>
+          <p:cNvPr id="91" name="CustomShape 1"/>
           <p:cNvSpPr/>
           <p:nvPr/>
         </p:nvSpPr>
         <p:spPr>
           <a:xfrm>
             <a:off x="457200" y="274680"/>
-            <a:ext cx="8225640" cy="1139040"/>
+            <a:ext cx="8225280" cy="1138680"/>
           </a:xfrm>
           <a:prstGeom prst="rect">
             <a:avLst/>
@@ -7841,14 +7810,14 @@
       </p:sp>
       <p:sp>
         <p:nvSpPr>
-          <p:cNvPr id="93" name="CustomShape 2"/>
+          <p:cNvPr id="92" name="CustomShape 2"/>
           <p:cNvSpPr/>
           <p:nvPr/>
         </p:nvSpPr>
         <p:spPr>
           <a:xfrm>
             <a:off x="457200" y="1600200"/>
-            <a:ext cx="8225640" cy="4521960"/>
+            <a:ext cx="8225280" cy="4521600"/>
           </a:xfrm>
           <a:prstGeom prst="rect">
             <a:avLst/>
@@ -7867,14 +7836,14 @@
       </p:sp>
       <p:sp>
         <p:nvSpPr>
-          <p:cNvPr id="94" name="CustomShape 3"/>
+          <p:cNvPr id="93" name="CustomShape 3"/>
           <p:cNvSpPr/>
           <p:nvPr/>
         </p:nvSpPr>
         <p:spPr>
           <a:xfrm>
             <a:off x="864000" y="4388040"/>
-            <a:ext cx="5976000" cy="1734120"/>
+            <a:ext cx="5975640" cy="1733760"/>
           </a:xfrm>
           <a:prstGeom prst="rect">
             <a:avLst/>
@@ -7914,13 +7883,13 @@
       </p:sp>
       <p:graphicFrame>
         <p:nvGraphicFramePr>
-          <p:cNvPr id="95" name="Table 4"/>
+          <p:cNvPr id="94" name="Table 4"/>
           <p:cNvGraphicFramePr/>
           <p:nvPr/>
         </p:nvGraphicFramePr>
         <p:xfrm>
           <a:off x="160920" y="1185120"/>
-          <a:ext cx="8521920" cy="2689920"/>
+          <a:ext cx="8521560" cy="2689920"/>
         </p:xfrm>
         <a:graphic>
           <a:graphicData uri="http://schemas.openxmlformats.org/drawingml/2006/table">
@@ -8327,56 +8296,44 @@
                   <a:txBody>
                     <a:bodyPr/>
                     <a:p>
-                      <a:pPr algn="ctr">
-                        <a:lnSpc>
-                          <a:spcPct val="100000"/>
-                        </a:lnSpc>
-                      </a:pPr>
-                      <a:r>
-                        <a:rPr lang="es-MX" strike="noStrike">
-                          <a:latin typeface="Arial"/>
-                        </a:rPr>
-                        <a:t>90min</a:t>
-                      </a:r>
-                      <a:endParaRPr/>
-                    </a:p>
-                  </a:txBody>
-                  <a:tcPr/>
-                </a:tc>
-                <a:tc>
-                  <a:txBody>
-                    <a:bodyPr/>
-                    <a:p>
-                      <a:pPr algn="ctr">
-                        <a:lnSpc>
-                          <a:spcPct val="100000"/>
-                        </a:lnSpc>
-                      </a:pPr>
-                      <a:r>
-                        <a:rPr lang="es-MX" strike="noStrike">
-                          <a:latin typeface="Arial"/>
-                        </a:rPr>
-                        <a:t>187min</a:t>
-                      </a:r>
-                      <a:endParaRPr/>
-                    </a:p>
-                  </a:txBody>
-                  <a:tcPr/>
-                </a:tc>
-                <a:tc>
-                  <a:txBody>
-                    <a:bodyPr/>
-                    <a:p>
-                      <a:pPr algn="r">
-                        <a:lnSpc>
-                          <a:spcPct val="100000"/>
-                        </a:lnSpc>
-                      </a:pPr>
-                      <a:r>
-                        <a:rPr lang="es-MX" strike="noStrike">
-                          <a:latin typeface="Arial"/>
-                        </a:rPr>
-                        <a:t>-108%</a:t>
+                      <a:pPr algn="ctr"/>
+                      <a:r>
+                        <a:rPr lang="es-MX">
+                          <a:latin typeface="Arial"/>
+                        </a:rPr>
+                        <a:t>120</a:t>
+                      </a:r>
+                      <a:endParaRPr/>
+                    </a:p>
+                  </a:txBody>
+                  <a:tcPr/>
+                </a:tc>
+                <a:tc>
+                  <a:txBody>
+                    <a:bodyPr/>
+                    <a:p>
+                      <a:pPr algn="ctr"/>
+                      <a:r>
+                        <a:rPr lang="es-MX">
+                          <a:latin typeface="Arial"/>
+                        </a:rPr>
+                        <a:t>187</a:t>
+                      </a:r>
+                      <a:endParaRPr/>
+                    </a:p>
+                  </a:txBody>
+                  <a:tcPr/>
+                </a:tc>
+                <a:tc>
+                  <a:txBody>
+                    <a:bodyPr/>
+                    <a:p>
+                      <a:pPr algn="r"/>
+                      <a:r>
+                        <a:rPr lang="es-MX">
+                          <a:latin typeface="Arial"/>
+                        </a:rPr>
+                        <a:t>-56%</a:t>
                       </a:r>
                       <a:endParaRPr/>
                     </a:p>
@@ -8526,14 +8483,14 @@
       </p:grpSpPr>
       <p:sp>
         <p:nvSpPr>
-          <p:cNvPr id="96" name="CustomShape 1"/>
+          <p:cNvPr id="95" name="CustomShape 1"/>
           <p:cNvSpPr/>
           <p:nvPr/>
         </p:nvSpPr>
         <p:spPr>
           <a:xfrm>
             <a:off x="457200" y="274680"/>
-            <a:ext cx="8225640" cy="1139040"/>
+            <a:ext cx="8225280" cy="1138680"/>
           </a:xfrm>
           <a:prstGeom prst="rect">
             <a:avLst/>
@@ -8573,14 +8530,14 @@
       </p:sp>
       <p:sp>
         <p:nvSpPr>
-          <p:cNvPr id="97" name="CustomShape 2"/>
+          <p:cNvPr id="96" name="CustomShape 2"/>
           <p:cNvSpPr/>
           <p:nvPr/>
         </p:nvSpPr>
         <p:spPr>
           <a:xfrm>
             <a:off x="457200" y="1600200"/>
-            <a:ext cx="8225640" cy="4521960"/>
+            <a:ext cx="8225280" cy="4521600"/>
           </a:xfrm>
           <a:prstGeom prst="rect">
             <a:avLst/>
@@ -8599,14 +8556,14 @@
       </p:sp>
       <p:sp>
         <p:nvSpPr>
-          <p:cNvPr id="98" name="CustomShape 3"/>
+          <p:cNvPr id="97" name="CustomShape 3"/>
           <p:cNvSpPr/>
           <p:nvPr/>
         </p:nvSpPr>
         <p:spPr>
           <a:xfrm>
             <a:off x="6365160" y="1124640"/>
-            <a:ext cx="2284200" cy="3105720"/>
+            <a:ext cx="2283840" cy="3105360"/>
           </a:xfrm>
           <a:prstGeom prst="rect">
             <a:avLst/>
@@ -8654,13 +8611,13 @@
       </p:sp>
       <p:graphicFrame>
         <p:nvGraphicFramePr>
-          <p:cNvPr id="99" name=""/>
+          <p:cNvPr id="98" name=""/>
           <p:cNvGraphicFramePr/>
           <p:nvPr/>
         </p:nvGraphicFramePr>
         <p:xfrm>
           <a:off x="360000" y="1248480"/>
-          <a:ext cx="5789880" cy="2855160"/>
+          <a:ext cx="5789520" cy="2854800"/>
         </p:xfrm>
         <a:graphic>
           <a:graphicData uri="http://schemas.openxmlformats.org/drawingml/2006/chart">
@@ -8729,14 +8686,14 @@
       </p:grpSpPr>
       <p:sp>
         <p:nvSpPr>
-          <p:cNvPr id="100" name="CustomShape 1"/>
+          <p:cNvPr id="99" name="CustomShape 1"/>
           <p:cNvSpPr/>
           <p:nvPr/>
         </p:nvSpPr>
         <p:spPr>
           <a:xfrm>
             <a:off x="457200" y="274680"/>
-            <a:ext cx="8225640" cy="1139040"/>
+            <a:ext cx="8225280" cy="1138680"/>
           </a:xfrm>
           <a:prstGeom prst="rect">
             <a:avLst/>
@@ -8776,14 +8733,14 @@
       </p:sp>
       <p:sp>
         <p:nvSpPr>
-          <p:cNvPr id="101" name="CustomShape 2"/>
+          <p:cNvPr id="100" name="CustomShape 2"/>
           <p:cNvSpPr/>
           <p:nvPr/>
         </p:nvSpPr>
         <p:spPr>
           <a:xfrm>
             <a:off x="457200" y="1600200"/>
-            <a:ext cx="8225640" cy="4521960"/>
+            <a:ext cx="8225280" cy="4521600"/>
           </a:xfrm>
           <a:prstGeom prst="rect">
             <a:avLst/>
@@ -8802,14 +8759,14 @@
       </p:sp>
       <p:sp>
         <p:nvSpPr>
-          <p:cNvPr id="102" name="CustomShape 3"/>
+          <p:cNvPr id="101" name="CustomShape 3"/>
           <p:cNvSpPr/>
           <p:nvPr/>
         </p:nvSpPr>
         <p:spPr>
           <a:xfrm>
             <a:off x="6183360" y="1416240"/>
-            <a:ext cx="2499480" cy="2831400"/>
+            <a:ext cx="2499120" cy="2831040"/>
           </a:xfrm>
           <a:prstGeom prst="rect">
             <a:avLst/>
@@ -8873,13 +8830,13 @@
       </p:sp>
       <p:graphicFrame>
         <p:nvGraphicFramePr>
-          <p:cNvPr id="103" name=""/>
+          <p:cNvPr id="102" name=""/>
           <p:cNvGraphicFramePr/>
           <p:nvPr/>
         </p:nvGraphicFramePr>
         <p:xfrm>
           <a:off x="216000" y="1368000"/>
-          <a:ext cx="5858280" cy="2855160"/>
+          <a:ext cx="5857920" cy="2854800"/>
         </p:xfrm>
         <a:graphic>
           <a:graphicData uri="http://schemas.openxmlformats.org/drawingml/2006/chart">
@@ -8948,14 +8905,14 @@
       </p:grpSpPr>
       <p:sp>
         <p:nvSpPr>
-          <p:cNvPr id="104" name="CustomShape 1"/>
+          <p:cNvPr id="103" name="CustomShape 1"/>
           <p:cNvSpPr/>
           <p:nvPr/>
         </p:nvSpPr>
         <p:spPr>
           <a:xfrm>
             <a:off x="457200" y="274680"/>
-            <a:ext cx="8225640" cy="1139040"/>
+            <a:ext cx="8225280" cy="1138680"/>
           </a:xfrm>
           <a:prstGeom prst="rect">
             <a:avLst/>
@@ -8995,14 +8952,14 @@
       </p:sp>
       <p:sp>
         <p:nvSpPr>
-          <p:cNvPr id="105" name="CustomShape 2"/>
+          <p:cNvPr id="104" name="CustomShape 2"/>
           <p:cNvSpPr/>
           <p:nvPr/>
         </p:nvSpPr>
         <p:spPr>
           <a:xfrm>
             <a:off x="457200" y="1600200"/>
-            <a:ext cx="8225640" cy="4521960"/>
+            <a:ext cx="8225280" cy="4521600"/>
           </a:xfrm>
           <a:prstGeom prst="rect">
             <a:avLst/>
@@ -9021,14 +8978,14 @@
       </p:sp>
       <p:sp>
         <p:nvSpPr>
-          <p:cNvPr id="106" name="CustomShape 3"/>
+          <p:cNvPr id="105" name="CustomShape 3"/>
           <p:cNvSpPr/>
           <p:nvPr/>
         </p:nvSpPr>
         <p:spPr>
           <a:xfrm>
             <a:off x="6647040" y="1357920"/>
-            <a:ext cx="2284200" cy="3105720"/>
+            <a:ext cx="2283840" cy="3105360"/>
           </a:xfrm>
           <a:prstGeom prst="rect">
             <a:avLst/>
@@ -9076,13 +9033,13 @@
       </p:sp>
       <p:graphicFrame>
         <p:nvGraphicFramePr>
-          <p:cNvPr id="107" name=""/>
+          <p:cNvPr id="106" name=""/>
           <p:cNvGraphicFramePr/>
           <p:nvPr/>
         </p:nvGraphicFramePr>
         <p:xfrm>
           <a:off x="0" y="1320120"/>
-          <a:ext cx="6646680" cy="2855520"/>
+          <a:ext cx="6646320" cy="2855160"/>
         </p:xfrm>
         <a:graphic>
           <a:graphicData uri="http://schemas.openxmlformats.org/drawingml/2006/chart">

</xml_diff>

<commit_message>
documentos sobre presentacion de resultados de reunion de monitoreo
</commit_message>
<xml_diff>
--- a/Proyectos/2015/Métricas y monitoreo/Reporte_monitoreo_151214.pptx
+++ b/Proyectos/2015/Métricas y monitoreo/Reporte_monitoreo_151214.pptx
@@ -102,11 +102,11 @@
         </c:ser>
         <c:gapWidth val="150"/>
         <c:overlap val="0"/>
-        <c:axId val="71422758"/>
-        <c:axId val="35529398"/>
+        <c:axId val="19104087"/>
+        <c:axId val="56678122"/>
       </c:barChart>
       <c:catAx>
-        <c:axId val="71422758"/>
+        <c:axId val="19104087"/>
         <c:scaling>
           <c:orientation val="minMax"/>
         </c:scaling>
@@ -123,14 +123,14 @@
             <a:round/>
           </a:ln>
         </c:spPr>
-        <c:crossAx val="35529398"/>
+        <c:crossAx val="56678122"/>
         <c:crosses val="autoZero"/>
         <c:auto val="1"/>
         <c:lblAlgn val="ctr"/>
         <c:lblOffset val="100"/>
       </c:catAx>
       <c:valAx>
-        <c:axId val="35529398"/>
+        <c:axId val="56678122"/>
         <c:scaling>
           <c:orientation val="minMax"/>
           <c:max val="1"/>
@@ -158,7 +158,7 @@
             <a:round/>
           </a:ln>
         </c:spPr>
-        <c:crossAx val="71422758"/>
+        <c:crossAx val="19104087"/>
         <c:crosses val="autoZero"/>
       </c:valAx>
       <c:dTable>
@@ -265,11 +265,11 @@
         </c:ser>
         <c:gapWidth val="150"/>
         <c:overlap val="0"/>
-        <c:axId val="81762148"/>
-        <c:axId val="32923419"/>
+        <c:axId val="63264712"/>
+        <c:axId val="49392493"/>
       </c:barChart>
       <c:catAx>
-        <c:axId val="81762148"/>
+        <c:axId val="63264712"/>
         <c:scaling>
           <c:orientation val="minMax"/>
         </c:scaling>
@@ -286,14 +286,14 @@
             <a:round/>
           </a:ln>
         </c:spPr>
-        <c:crossAx val="32923419"/>
+        <c:crossAx val="49392493"/>
         <c:crosses val="autoZero"/>
         <c:auto val="1"/>
         <c:lblAlgn val="ctr"/>
         <c:lblOffset val="100"/>
       </c:catAx>
       <c:valAx>
-        <c:axId val="32923419"/>
+        <c:axId val="49392493"/>
         <c:scaling>
           <c:orientation val="minMax"/>
           <c:max val="1"/>
@@ -321,7 +321,7 @@
             <a:round/>
           </a:ln>
         </c:spPr>
-        <c:crossAx val="81762148"/>
+        <c:crossAx val="63264712"/>
         <c:crosses val="autoZero"/>
       </c:valAx>
       <c:dTable>
@@ -440,11 +440,11 @@
         </c:ser>
         <c:gapWidth val="150"/>
         <c:overlap val="0"/>
-        <c:axId val="44216020"/>
-        <c:axId val="13949922"/>
+        <c:axId val="8600017"/>
+        <c:axId val="81908796"/>
       </c:barChart>
       <c:catAx>
-        <c:axId val="44216020"/>
+        <c:axId val="8600017"/>
         <c:scaling>
           <c:orientation val="minMax"/>
         </c:scaling>
@@ -461,14 +461,14 @@
             <a:round/>
           </a:ln>
         </c:spPr>
-        <c:crossAx val="13949922"/>
+        <c:crossAx val="81908796"/>
         <c:crosses val="autoZero"/>
         <c:auto val="1"/>
         <c:lblAlgn val="ctr"/>
         <c:lblOffset val="100"/>
       </c:catAx>
       <c:valAx>
-        <c:axId val="13949922"/>
+        <c:axId val="81908796"/>
         <c:scaling>
           <c:orientation val="minMax"/>
           <c:max val="1"/>
@@ -496,7 +496,7 @@
             <a:round/>
           </a:ln>
         </c:spPr>
-        <c:crossAx val="44216020"/>
+        <c:crossAx val="8600017"/>
         <c:crosses val="autoZero"/>
       </c:valAx>
       <c:dTable>
@@ -638,11 +638,11 @@
         </c:ser>
         <c:gapWidth val="150"/>
         <c:overlap val="0"/>
-        <c:axId val="84313614"/>
-        <c:axId val="44967745"/>
+        <c:axId val="16394054"/>
+        <c:axId val="27685719"/>
       </c:barChart>
       <c:catAx>
-        <c:axId val="84313614"/>
+        <c:axId val="16394054"/>
         <c:scaling>
           <c:orientation val="minMax"/>
         </c:scaling>
@@ -659,14 +659,14 @@
             <a:round/>
           </a:ln>
         </c:spPr>
-        <c:crossAx val="44967745"/>
+        <c:crossAx val="27685719"/>
         <c:crosses val="autoZero"/>
         <c:auto val="1"/>
         <c:lblAlgn val="ctr"/>
         <c:lblOffset val="100"/>
       </c:catAx>
       <c:valAx>
-        <c:axId val="44967745"/>
+        <c:axId val="27685719"/>
         <c:scaling>
           <c:orientation val="minMax"/>
         </c:scaling>
@@ -693,7 +693,7 @@
             <a:round/>
           </a:ln>
         </c:spPr>
-        <c:crossAx val="84313614"/>
+        <c:crossAx val="16394054"/>
         <c:crosses val="autoZero"/>
       </c:valAx>
       <c:spPr>
@@ -780,7 +780,7 @@
         <p:spPr>
           <a:xfrm>
             <a:off x="457200" y="273600"/>
-            <a:ext cx="8228880" cy="1144440"/>
+            <a:ext cx="8228520" cy="1144080"/>
           </a:xfrm>
           <a:prstGeom prst="rect">
             <a:avLst/>
@@ -807,7 +807,7 @@
         <p:spPr>
           <a:xfrm>
             <a:off x="457200" y="1604520"/>
-            <a:ext cx="8228880" cy="1896840"/>
+            <a:ext cx="8228520" cy="1896480"/>
           </a:xfrm>
           <a:prstGeom prst="rect">
             <a:avLst/>
@@ -832,8 +832,8 @@
         </p:nvSpPr>
         <p:spPr>
           <a:xfrm>
-            <a:off x="457200" y="3682080"/>
-            <a:ext cx="8228880" cy="1896840"/>
+            <a:off x="457200" y="3681720"/>
+            <a:ext cx="8228520" cy="1896480"/>
           </a:xfrm>
           <a:prstGeom prst="rect">
             <a:avLst/>
@@ -881,7 +881,7 @@
         <p:spPr>
           <a:xfrm>
             <a:off x="457200" y="273600"/>
-            <a:ext cx="8228880" cy="1144440"/>
+            <a:ext cx="8228520" cy="1144080"/>
           </a:xfrm>
           <a:prstGeom prst="rect">
             <a:avLst/>
@@ -908,7 +908,7 @@
         <p:spPr>
           <a:xfrm>
             <a:off x="457200" y="1604520"/>
-            <a:ext cx="4015440" cy="1896840"/>
+            <a:ext cx="4015440" cy="1896480"/>
           </a:xfrm>
           <a:prstGeom prst="rect">
             <a:avLst/>
@@ -934,7 +934,7 @@
         <p:spPr>
           <a:xfrm>
             <a:off x="4673880" y="1604520"/>
-            <a:ext cx="4015440" cy="1896840"/>
+            <a:ext cx="4015440" cy="1896480"/>
           </a:xfrm>
           <a:prstGeom prst="rect">
             <a:avLst/>
@@ -959,8 +959,8 @@
         </p:nvSpPr>
         <p:spPr>
           <a:xfrm>
-            <a:off x="4673880" y="3682080"/>
-            <a:ext cx="4015440" cy="1896840"/>
+            <a:off x="4673880" y="3681720"/>
+            <a:ext cx="4015440" cy="1896480"/>
           </a:xfrm>
           <a:prstGeom prst="rect">
             <a:avLst/>
@@ -985,8 +985,8 @@
         </p:nvSpPr>
         <p:spPr>
           <a:xfrm>
-            <a:off x="457200" y="3682080"/>
-            <a:ext cx="4015440" cy="1896840"/>
+            <a:off x="457200" y="3681720"/>
+            <a:ext cx="4015440" cy="1896480"/>
           </a:xfrm>
           <a:prstGeom prst="rect">
             <a:avLst/>
@@ -1034,7 +1034,7 @@
         <p:spPr>
           <a:xfrm>
             <a:off x="457200" y="273600"/>
-            <a:ext cx="8228880" cy="1144440"/>
+            <a:ext cx="8228520" cy="1144080"/>
           </a:xfrm>
           <a:prstGeom prst="rect">
             <a:avLst/>
@@ -1061,7 +1061,7 @@
         <p:spPr>
           <a:xfrm>
             <a:off x="457200" y="1604520"/>
-            <a:ext cx="8228880" cy="3976920"/>
+            <a:ext cx="8228520" cy="3976560"/>
           </a:xfrm>
           <a:prstGeom prst="rect">
             <a:avLst/>
@@ -1087,7 +1087,7 @@
         <p:spPr>
           <a:xfrm>
             <a:off x="457200" y="1604520"/>
-            <a:ext cx="8228880" cy="3976920"/>
+            <a:ext cx="8228520" cy="3976560"/>
           </a:xfrm>
           <a:prstGeom prst="rect">
             <a:avLst/>
@@ -1112,8 +1112,8 @@
         </p:blipFill>
         <p:spPr>
           <a:xfrm>
-            <a:off x="2079360" y="1604160"/>
-            <a:ext cx="4984200" cy="3976920"/>
+            <a:off x="2079360" y="1604520"/>
+            <a:ext cx="4983840" cy="3976560"/>
           </a:xfrm>
           <a:prstGeom prst="rect">
             <a:avLst/>
@@ -1135,8 +1135,8 @@
         </p:blipFill>
         <p:spPr>
           <a:xfrm>
-            <a:off x="2079360" y="1604160"/>
-            <a:ext cx="4984200" cy="3976920"/>
+            <a:off x="2079360" y="1604520"/>
+            <a:ext cx="4983840" cy="3976560"/>
           </a:xfrm>
           <a:prstGeom prst="rect">
             <a:avLst/>
@@ -1192,7 +1192,7 @@
       </p:grpSpPr>
       <p:sp>
         <p:nvSpPr>
-          <p:cNvPr id="43" name="PlaceHolder 1"/>
+          <p:cNvPr id="42" name="PlaceHolder 1"/>
           <p:cNvSpPr>
             <a:spLocks noGrp="1"/>
           </p:cNvSpPr>
@@ -1203,7 +1203,7 @@
         <p:spPr>
           <a:xfrm>
             <a:off x="457200" y="273600"/>
-            <a:ext cx="8228880" cy="1144440"/>
+            <a:ext cx="8228520" cy="1144080"/>
           </a:xfrm>
           <a:prstGeom prst="rect">
             <a:avLst/>
@@ -1219,7 +1219,7 @@
       </p:sp>
       <p:sp>
         <p:nvSpPr>
-          <p:cNvPr id="44" name="PlaceHolder 2"/>
+          <p:cNvPr id="43" name="PlaceHolder 2"/>
           <p:cNvSpPr>
             <a:spLocks noGrp="1"/>
           </p:cNvSpPr>
@@ -1230,7 +1230,7 @@
         <p:spPr>
           <a:xfrm>
             <a:off x="457200" y="1604520"/>
-            <a:ext cx="8228880" cy="3976920"/>
+            <a:ext cx="8228520" cy="3976560"/>
           </a:xfrm>
           <a:prstGeom prst="rect">
             <a:avLst/>
@@ -1268,7 +1268,7 @@
       </p:grpSpPr>
       <p:sp>
         <p:nvSpPr>
-          <p:cNvPr id="45" name="PlaceHolder 1"/>
+          <p:cNvPr id="44" name="PlaceHolder 1"/>
           <p:cNvSpPr>
             <a:spLocks noGrp="1"/>
           </p:cNvSpPr>
@@ -1279,7 +1279,7 @@
         <p:spPr>
           <a:xfrm>
             <a:off x="457200" y="273600"/>
-            <a:ext cx="8228880" cy="1144440"/>
+            <a:ext cx="8228520" cy="1144080"/>
           </a:xfrm>
           <a:prstGeom prst="rect">
             <a:avLst/>
@@ -1295,7 +1295,7 @@
       </p:sp>
       <p:sp>
         <p:nvSpPr>
-          <p:cNvPr id="46" name="PlaceHolder 2"/>
+          <p:cNvPr id="45" name="PlaceHolder 2"/>
           <p:cNvSpPr>
             <a:spLocks noGrp="1"/>
           </p:cNvSpPr>
@@ -1306,7 +1306,7 @@
         <p:spPr>
           <a:xfrm>
             <a:off x="457200" y="1604520"/>
-            <a:ext cx="8228880" cy="3976920"/>
+            <a:ext cx="8228520" cy="3976560"/>
           </a:xfrm>
           <a:prstGeom prst="rect">
             <a:avLst/>
@@ -1343,7 +1343,7 @@
       </p:grpSpPr>
       <p:sp>
         <p:nvSpPr>
-          <p:cNvPr id="47" name="PlaceHolder 1"/>
+          <p:cNvPr id="46" name="PlaceHolder 1"/>
           <p:cNvSpPr>
             <a:spLocks noGrp="1"/>
           </p:cNvSpPr>
@@ -1354,7 +1354,7 @@
         <p:spPr>
           <a:xfrm>
             <a:off x="457200" y="273600"/>
-            <a:ext cx="8228880" cy="1144440"/>
+            <a:ext cx="8228520" cy="1144080"/>
           </a:xfrm>
           <a:prstGeom prst="rect">
             <a:avLst/>
@@ -1370,7 +1370,7 @@
       </p:sp>
       <p:sp>
         <p:nvSpPr>
-          <p:cNvPr id="48" name="PlaceHolder 2"/>
+          <p:cNvPr id="47" name="PlaceHolder 2"/>
           <p:cNvSpPr>
             <a:spLocks noGrp="1"/>
           </p:cNvSpPr>
@@ -1381,7 +1381,7 @@
         <p:spPr>
           <a:xfrm>
             <a:off x="457200" y="1604520"/>
-            <a:ext cx="4015440" cy="3976920"/>
+            <a:ext cx="4015440" cy="3976560"/>
           </a:xfrm>
           <a:prstGeom prst="rect">
             <a:avLst/>
@@ -1396,7 +1396,7 @@
       </p:sp>
       <p:sp>
         <p:nvSpPr>
-          <p:cNvPr id="49" name="PlaceHolder 3"/>
+          <p:cNvPr id="48" name="PlaceHolder 3"/>
           <p:cNvSpPr>
             <a:spLocks noGrp="1"/>
           </p:cNvSpPr>
@@ -1407,7 +1407,7 @@
         <p:spPr>
           <a:xfrm>
             <a:off x="4673880" y="1604520"/>
-            <a:ext cx="4015440" cy="3976920"/>
+            <a:ext cx="4015440" cy="3976560"/>
           </a:xfrm>
           <a:prstGeom prst="rect">
             <a:avLst/>
@@ -1444,7 +1444,7 @@
       </p:grpSpPr>
       <p:sp>
         <p:nvSpPr>
-          <p:cNvPr id="50" name="PlaceHolder 1"/>
+          <p:cNvPr id="49" name="PlaceHolder 1"/>
           <p:cNvSpPr>
             <a:spLocks noGrp="1"/>
           </p:cNvSpPr>
@@ -1455,7 +1455,7 @@
         <p:spPr>
           <a:xfrm>
             <a:off x="457200" y="273600"/>
-            <a:ext cx="8228880" cy="1144440"/>
+            <a:ext cx="8228520" cy="1144080"/>
           </a:xfrm>
           <a:prstGeom prst="rect">
             <a:avLst/>
@@ -1493,7 +1493,7 @@
       </p:grpSpPr>
       <p:sp>
         <p:nvSpPr>
-          <p:cNvPr id="51" name="PlaceHolder 1"/>
+          <p:cNvPr id="50" name="PlaceHolder 1"/>
           <p:cNvSpPr>
             <a:spLocks noGrp="1"/>
           </p:cNvSpPr>
@@ -1504,7 +1504,7 @@
         <p:spPr>
           <a:xfrm>
             <a:off x="457200" y="273600"/>
-            <a:ext cx="8228880" cy="5306400"/>
+            <a:ext cx="8228520" cy="5304600"/>
           </a:xfrm>
           <a:prstGeom prst="rect">
             <a:avLst/>
@@ -1542,7 +1542,7 @@
       </p:grpSpPr>
       <p:sp>
         <p:nvSpPr>
-          <p:cNvPr id="52" name="PlaceHolder 1"/>
+          <p:cNvPr id="51" name="PlaceHolder 1"/>
           <p:cNvSpPr>
             <a:spLocks noGrp="1"/>
           </p:cNvSpPr>
@@ -1553,7 +1553,7 @@
         <p:spPr>
           <a:xfrm>
             <a:off x="457200" y="273600"/>
-            <a:ext cx="8228880" cy="1144440"/>
+            <a:ext cx="8228520" cy="1144080"/>
           </a:xfrm>
           <a:prstGeom prst="rect">
             <a:avLst/>
@@ -1569,7 +1569,7 @@
       </p:sp>
       <p:sp>
         <p:nvSpPr>
-          <p:cNvPr id="53" name="PlaceHolder 2"/>
+          <p:cNvPr id="52" name="PlaceHolder 2"/>
           <p:cNvSpPr>
             <a:spLocks noGrp="1"/>
           </p:cNvSpPr>
@@ -1580,7 +1580,7 @@
         <p:spPr>
           <a:xfrm>
             <a:off x="457200" y="1604520"/>
-            <a:ext cx="4015440" cy="1896840"/>
+            <a:ext cx="4015440" cy="1896480"/>
           </a:xfrm>
           <a:prstGeom prst="rect">
             <a:avLst/>
@@ -1595,7 +1595,7 @@
       </p:sp>
       <p:sp>
         <p:nvSpPr>
-          <p:cNvPr id="54" name="PlaceHolder 3"/>
+          <p:cNvPr id="53" name="PlaceHolder 3"/>
           <p:cNvSpPr>
             <a:spLocks noGrp="1"/>
           </p:cNvSpPr>
@@ -1605,8 +1605,8 @@
         </p:nvSpPr>
         <p:spPr>
           <a:xfrm>
-            <a:off x="457200" y="3682080"/>
-            <a:ext cx="4015440" cy="1896840"/>
+            <a:off x="457200" y="3681720"/>
+            <a:ext cx="4015440" cy="1896480"/>
           </a:xfrm>
           <a:prstGeom prst="rect">
             <a:avLst/>
@@ -1621,7 +1621,7 @@
       </p:sp>
       <p:sp>
         <p:nvSpPr>
-          <p:cNvPr id="55" name="PlaceHolder 4"/>
+          <p:cNvPr id="54" name="PlaceHolder 4"/>
           <p:cNvSpPr>
             <a:spLocks noGrp="1"/>
           </p:cNvSpPr>
@@ -1632,7 +1632,7 @@
         <p:spPr>
           <a:xfrm>
             <a:off x="4673880" y="1604520"/>
-            <a:ext cx="4015440" cy="3976920"/>
+            <a:ext cx="4015440" cy="3976560"/>
           </a:xfrm>
           <a:prstGeom prst="rect">
             <a:avLst/>
@@ -1680,7 +1680,7 @@
         <p:spPr>
           <a:xfrm>
             <a:off x="457200" y="273600"/>
-            <a:ext cx="8228880" cy="1144440"/>
+            <a:ext cx="8228520" cy="1144080"/>
           </a:xfrm>
           <a:prstGeom prst="rect">
             <a:avLst/>
@@ -1707,7 +1707,7 @@
         <p:spPr>
           <a:xfrm>
             <a:off x="457200" y="1604520"/>
-            <a:ext cx="8228880" cy="3976920"/>
+            <a:ext cx="8228520" cy="3976560"/>
           </a:xfrm>
           <a:prstGeom prst="rect">
             <a:avLst/>
@@ -1745,7 +1745,7 @@
       </p:grpSpPr>
       <p:sp>
         <p:nvSpPr>
-          <p:cNvPr id="56" name="PlaceHolder 1"/>
+          <p:cNvPr id="55" name="PlaceHolder 1"/>
           <p:cNvSpPr>
             <a:spLocks noGrp="1"/>
           </p:cNvSpPr>
@@ -1756,7 +1756,7 @@
         <p:spPr>
           <a:xfrm>
             <a:off x="457200" y="273600"/>
-            <a:ext cx="8228880" cy="1144440"/>
+            <a:ext cx="8228520" cy="1144080"/>
           </a:xfrm>
           <a:prstGeom prst="rect">
             <a:avLst/>
@@ -1772,7 +1772,7 @@
       </p:sp>
       <p:sp>
         <p:nvSpPr>
-          <p:cNvPr id="57" name="PlaceHolder 2"/>
+          <p:cNvPr id="56" name="PlaceHolder 2"/>
           <p:cNvSpPr>
             <a:spLocks noGrp="1"/>
           </p:cNvSpPr>
@@ -1783,7 +1783,7 @@
         <p:spPr>
           <a:xfrm>
             <a:off x="457200" y="1604520"/>
-            <a:ext cx="4015440" cy="3976920"/>
+            <a:ext cx="4015440" cy="3976560"/>
           </a:xfrm>
           <a:prstGeom prst="rect">
             <a:avLst/>
@@ -1798,7 +1798,7 @@
       </p:sp>
       <p:sp>
         <p:nvSpPr>
-          <p:cNvPr id="58" name="PlaceHolder 3"/>
+          <p:cNvPr id="57" name="PlaceHolder 3"/>
           <p:cNvSpPr>
             <a:spLocks noGrp="1"/>
           </p:cNvSpPr>
@@ -1809,7 +1809,7 @@
         <p:spPr>
           <a:xfrm>
             <a:off x="4673880" y="1604520"/>
-            <a:ext cx="4015440" cy="1896840"/>
+            <a:ext cx="4015440" cy="1896480"/>
           </a:xfrm>
           <a:prstGeom prst="rect">
             <a:avLst/>
@@ -1824,7 +1824,7 @@
       </p:sp>
       <p:sp>
         <p:nvSpPr>
-          <p:cNvPr id="59" name="PlaceHolder 4"/>
+          <p:cNvPr id="58" name="PlaceHolder 4"/>
           <p:cNvSpPr>
             <a:spLocks noGrp="1"/>
           </p:cNvSpPr>
@@ -1834,8 +1834,8 @@
         </p:nvSpPr>
         <p:spPr>
           <a:xfrm>
-            <a:off x="4673880" y="3682080"/>
-            <a:ext cx="4015440" cy="1896840"/>
+            <a:off x="4673880" y="3681720"/>
+            <a:ext cx="4015440" cy="1896480"/>
           </a:xfrm>
           <a:prstGeom prst="rect">
             <a:avLst/>
@@ -1872,7 +1872,7 @@
       </p:grpSpPr>
       <p:sp>
         <p:nvSpPr>
-          <p:cNvPr id="60" name="PlaceHolder 1"/>
+          <p:cNvPr id="59" name="PlaceHolder 1"/>
           <p:cNvSpPr>
             <a:spLocks noGrp="1"/>
           </p:cNvSpPr>
@@ -1883,7 +1883,7 @@
         <p:spPr>
           <a:xfrm>
             <a:off x="457200" y="273600"/>
-            <a:ext cx="8228880" cy="1144440"/>
+            <a:ext cx="8228520" cy="1144080"/>
           </a:xfrm>
           <a:prstGeom prst="rect">
             <a:avLst/>
@@ -1899,7 +1899,7 @@
       </p:sp>
       <p:sp>
         <p:nvSpPr>
-          <p:cNvPr id="61" name="PlaceHolder 2"/>
+          <p:cNvPr id="60" name="PlaceHolder 2"/>
           <p:cNvSpPr>
             <a:spLocks noGrp="1"/>
           </p:cNvSpPr>
@@ -1910,7 +1910,7 @@
         <p:spPr>
           <a:xfrm>
             <a:off x="457200" y="1604520"/>
-            <a:ext cx="4015440" cy="1896840"/>
+            <a:ext cx="4015440" cy="1896480"/>
           </a:xfrm>
           <a:prstGeom prst="rect">
             <a:avLst/>
@@ -1925,7 +1925,7 @@
       </p:sp>
       <p:sp>
         <p:nvSpPr>
-          <p:cNvPr id="62" name="PlaceHolder 3"/>
+          <p:cNvPr id="61" name="PlaceHolder 3"/>
           <p:cNvSpPr>
             <a:spLocks noGrp="1"/>
           </p:cNvSpPr>
@@ -1936,7 +1936,7 @@
         <p:spPr>
           <a:xfrm>
             <a:off x="4673880" y="1604520"/>
-            <a:ext cx="4015440" cy="1896840"/>
+            <a:ext cx="4015440" cy="1896480"/>
           </a:xfrm>
           <a:prstGeom prst="rect">
             <a:avLst/>
@@ -1951,7 +1951,7 @@
       </p:sp>
       <p:sp>
         <p:nvSpPr>
-          <p:cNvPr id="63" name="PlaceHolder 4"/>
+          <p:cNvPr id="62" name="PlaceHolder 4"/>
           <p:cNvSpPr>
             <a:spLocks noGrp="1"/>
           </p:cNvSpPr>
@@ -1961,8 +1961,8 @@
         </p:nvSpPr>
         <p:spPr>
           <a:xfrm>
-            <a:off x="457200" y="3682080"/>
-            <a:ext cx="8228880" cy="1896840"/>
+            <a:off x="457200" y="3681720"/>
+            <a:ext cx="8228520" cy="1896480"/>
           </a:xfrm>
           <a:prstGeom prst="rect">
             <a:avLst/>
@@ -1999,7 +1999,7 @@
       </p:grpSpPr>
       <p:sp>
         <p:nvSpPr>
-          <p:cNvPr id="64" name="PlaceHolder 1"/>
+          <p:cNvPr id="63" name="PlaceHolder 1"/>
           <p:cNvSpPr>
             <a:spLocks noGrp="1"/>
           </p:cNvSpPr>
@@ -2010,7 +2010,7 @@
         <p:spPr>
           <a:xfrm>
             <a:off x="457200" y="273600"/>
-            <a:ext cx="8228880" cy="1144440"/>
+            <a:ext cx="8228520" cy="1144080"/>
           </a:xfrm>
           <a:prstGeom prst="rect">
             <a:avLst/>
@@ -2026,7 +2026,7 @@
       </p:sp>
       <p:sp>
         <p:nvSpPr>
-          <p:cNvPr id="65" name="PlaceHolder 2"/>
+          <p:cNvPr id="64" name="PlaceHolder 2"/>
           <p:cNvSpPr>
             <a:spLocks noGrp="1"/>
           </p:cNvSpPr>
@@ -2037,7 +2037,7 @@
         <p:spPr>
           <a:xfrm>
             <a:off x="457200" y="1604520"/>
-            <a:ext cx="8228880" cy="1896840"/>
+            <a:ext cx="8228520" cy="1896480"/>
           </a:xfrm>
           <a:prstGeom prst="rect">
             <a:avLst/>
@@ -2052,7 +2052,7 @@
       </p:sp>
       <p:sp>
         <p:nvSpPr>
-          <p:cNvPr id="66" name="PlaceHolder 3"/>
+          <p:cNvPr id="65" name="PlaceHolder 3"/>
           <p:cNvSpPr>
             <a:spLocks noGrp="1"/>
           </p:cNvSpPr>
@@ -2062,8 +2062,8 @@
         </p:nvSpPr>
         <p:spPr>
           <a:xfrm>
-            <a:off x="457200" y="3682080"/>
-            <a:ext cx="8228880" cy="1896840"/>
+            <a:off x="457200" y="3681720"/>
+            <a:ext cx="8228520" cy="1896480"/>
           </a:xfrm>
           <a:prstGeom prst="rect">
             <a:avLst/>
@@ -2100,7 +2100,7 @@
       </p:grpSpPr>
       <p:sp>
         <p:nvSpPr>
-          <p:cNvPr id="67" name="PlaceHolder 1"/>
+          <p:cNvPr id="66" name="PlaceHolder 1"/>
           <p:cNvSpPr>
             <a:spLocks noGrp="1"/>
           </p:cNvSpPr>
@@ -2111,7 +2111,7 @@
         <p:spPr>
           <a:xfrm>
             <a:off x="457200" y="273600"/>
-            <a:ext cx="8228880" cy="1144440"/>
+            <a:ext cx="8228520" cy="1144080"/>
           </a:xfrm>
           <a:prstGeom prst="rect">
             <a:avLst/>
@@ -2127,7 +2127,7 @@
       </p:sp>
       <p:sp>
         <p:nvSpPr>
-          <p:cNvPr id="68" name="PlaceHolder 2"/>
+          <p:cNvPr id="67" name="PlaceHolder 2"/>
           <p:cNvSpPr>
             <a:spLocks noGrp="1"/>
           </p:cNvSpPr>
@@ -2138,7 +2138,7 @@
         <p:spPr>
           <a:xfrm>
             <a:off x="457200" y="1604520"/>
-            <a:ext cx="4015440" cy="1896840"/>
+            <a:ext cx="4015440" cy="1896480"/>
           </a:xfrm>
           <a:prstGeom prst="rect">
             <a:avLst/>
@@ -2153,7 +2153,7 @@
       </p:sp>
       <p:sp>
         <p:nvSpPr>
-          <p:cNvPr id="69" name="PlaceHolder 3"/>
+          <p:cNvPr id="68" name="PlaceHolder 3"/>
           <p:cNvSpPr>
             <a:spLocks noGrp="1"/>
           </p:cNvSpPr>
@@ -2164,7 +2164,7 @@
         <p:spPr>
           <a:xfrm>
             <a:off x="4673880" y="1604520"/>
-            <a:ext cx="4015440" cy="1896840"/>
+            <a:ext cx="4015440" cy="1896480"/>
           </a:xfrm>
           <a:prstGeom prst="rect">
             <a:avLst/>
@@ -2179,7 +2179,7 @@
       </p:sp>
       <p:sp>
         <p:nvSpPr>
-          <p:cNvPr id="70" name="PlaceHolder 4"/>
+          <p:cNvPr id="69" name="PlaceHolder 4"/>
           <p:cNvSpPr>
             <a:spLocks noGrp="1"/>
           </p:cNvSpPr>
@@ -2189,8 +2189,8 @@
         </p:nvSpPr>
         <p:spPr>
           <a:xfrm>
-            <a:off x="4673880" y="3682080"/>
-            <a:ext cx="4015440" cy="1896840"/>
+            <a:off x="4673880" y="3681720"/>
+            <a:ext cx="4015440" cy="1896480"/>
           </a:xfrm>
           <a:prstGeom prst="rect">
             <a:avLst/>
@@ -2205,7 +2205,7 @@
       </p:sp>
       <p:sp>
         <p:nvSpPr>
-          <p:cNvPr id="71" name="PlaceHolder 5"/>
+          <p:cNvPr id="70" name="PlaceHolder 5"/>
           <p:cNvSpPr>
             <a:spLocks noGrp="1"/>
           </p:cNvSpPr>
@@ -2215,8 +2215,8 @@
         </p:nvSpPr>
         <p:spPr>
           <a:xfrm>
-            <a:off x="457200" y="3682080"/>
-            <a:ext cx="4015440" cy="1896840"/>
+            <a:off x="457200" y="3681720"/>
+            <a:ext cx="4015440" cy="1896480"/>
           </a:xfrm>
           <a:prstGeom prst="rect">
             <a:avLst/>
@@ -2253,7 +2253,7 @@
       </p:grpSpPr>
       <p:sp>
         <p:nvSpPr>
-          <p:cNvPr id="72" name="PlaceHolder 1"/>
+          <p:cNvPr id="71" name="PlaceHolder 1"/>
           <p:cNvSpPr>
             <a:spLocks noGrp="1"/>
           </p:cNvSpPr>
@@ -2264,7 +2264,7 @@
         <p:spPr>
           <a:xfrm>
             <a:off x="457200" y="273600"/>
-            <a:ext cx="8228880" cy="1144440"/>
+            <a:ext cx="8228520" cy="1144080"/>
           </a:xfrm>
           <a:prstGeom prst="rect">
             <a:avLst/>
@@ -2280,7 +2280,7 @@
       </p:sp>
       <p:sp>
         <p:nvSpPr>
-          <p:cNvPr id="73" name="PlaceHolder 2"/>
+          <p:cNvPr id="72" name="PlaceHolder 2"/>
           <p:cNvSpPr>
             <a:spLocks noGrp="1"/>
           </p:cNvSpPr>
@@ -2291,7 +2291,7 @@
         <p:spPr>
           <a:xfrm>
             <a:off x="457200" y="1604520"/>
-            <a:ext cx="8228880" cy="3976920"/>
+            <a:ext cx="8228520" cy="3976560"/>
           </a:xfrm>
           <a:prstGeom prst="rect">
             <a:avLst/>
@@ -2306,7 +2306,7 @@
       </p:sp>
       <p:sp>
         <p:nvSpPr>
-          <p:cNvPr id="74" name="PlaceHolder 3"/>
+          <p:cNvPr id="73" name="PlaceHolder 3"/>
           <p:cNvSpPr>
             <a:spLocks noGrp="1"/>
           </p:cNvSpPr>
@@ -2317,7 +2317,7 @@
         <p:spPr>
           <a:xfrm>
             <a:off x="457200" y="1604520"/>
-            <a:ext cx="8228880" cy="3976920"/>
+            <a:ext cx="8228520" cy="3976560"/>
           </a:xfrm>
           <a:prstGeom prst="rect">
             <a:avLst/>
@@ -2330,6 +2330,29 @@
           </a:p>
         </p:txBody>
       </p:sp>
+      <p:pic>
+        <p:nvPicPr>
+          <p:cNvPr id="74" name="" descr=""/>
+          <p:cNvPicPr/>
+          <p:nvPr/>
+        </p:nvPicPr>
+        <p:blipFill>
+          <a:blip r:embed="rId2"/>
+          <a:stretch/>
+        </p:blipFill>
+        <p:spPr>
+          <a:xfrm>
+            <a:off x="2079360" y="1604520"/>
+            <a:ext cx="4983840" cy="3976560"/>
+          </a:xfrm>
+          <a:prstGeom prst="rect">
+            <a:avLst/>
+          </a:prstGeom>
+          <a:ln>
+            <a:noFill/>
+          </a:ln>
+        </p:spPr>
+      </p:pic>
       <p:pic>
         <p:nvPicPr>
           <p:cNvPr id="75" name="" descr=""/>
@@ -2337,36 +2360,13 @@
           <p:nvPr/>
         </p:nvPicPr>
         <p:blipFill>
-          <a:blip r:embed="rId2"/>
-          <a:stretch/>
-        </p:blipFill>
-        <p:spPr>
-          <a:xfrm>
-            <a:off x="2079360" y="1604160"/>
-            <a:ext cx="4984200" cy="3976920"/>
-          </a:xfrm>
-          <a:prstGeom prst="rect">
-            <a:avLst/>
-          </a:prstGeom>
-          <a:ln>
-            <a:noFill/>
-          </a:ln>
-        </p:spPr>
-      </p:pic>
-      <p:pic>
-        <p:nvPicPr>
-          <p:cNvPr id="76" name="" descr=""/>
-          <p:cNvPicPr/>
-          <p:nvPr/>
-        </p:nvPicPr>
-        <p:blipFill>
           <a:blip r:embed="rId3"/>
           <a:stretch/>
         </p:blipFill>
         <p:spPr>
           <a:xfrm>
-            <a:off x="2079360" y="1604160"/>
-            <a:ext cx="4984200" cy="3976920"/>
+            <a:off x="2079360" y="1604520"/>
+            <a:ext cx="4983840" cy="3976560"/>
           </a:xfrm>
           <a:prstGeom prst="rect">
             <a:avLst/>
@@ -2411,7 +2411,7 @@
         <p:spPr>
           <a:xfrm>
             <a:off x="457200" y="273600"/>
-            <a:ext cx="8228880" cy="1144440"/>
+            <a:ext cx="8228520" cy="1144080"/>
           </a:xfrm>
           <a:prstGeom prst="rect">
             <a:avLst/>
@@ -2438,7 +2438,7 @@
         <p:spPr>
           <a:xfrm>
             <a:off x="457200" y="1604520"/>
-            <a:ext cx="8228880" cy="3976920"/>
+            <a:ext cx="8228520" cy="3976560"/>
           </a:xfrm>
           <a:prstGeom prst="rect">
             <a:avLst/>
@@ -2486,7 +2486,7 @@
         <p:spPr>
           <a:xfrm>
             <a:off x="457200" y="273600"/>
-            <a:ext cx="8228880" cy="1144440"/>
+            <a:ext cx="8228520" cy="1144080"/>
           </a:xfrm>
           <a:prstGeom prst="rect">
             <a:avLst/>
@@ -2513,7 +2513,7 @@
         <p:spPr>
           <a:xfrm>
             <a:off x="457200" y="1604520"/>
-            <a:ext cx="4015440" cy="3976920"/>
+            <a:ext cx="4015440" cy="3976560"/>
           </a:xfrm>
           <a:prstGeom prst="rect">
             <a:avLst/>
@@ -2539,7 +2539,7 @@
         <p:spPr>
           <a:xfrm>
             <a:off x="4673880" y="1604520"/>
-            <a:ext cx="4015440" cy="3976920"/>
+            <a:ext cx="4015440" cy="3976560"/>
           </a:xfrm>
           <a:prstGeom prst="rect">
             <a:avLst/>
@@ -2587,7 +2587,7 @@
         <p:spPr>
           <a:xfrm>
             <a:off x="457200" y="273600"/>
-            <a:ext cx="8228880" cy="1144440"/>
+            <a:ext cx="8228520" cy="1144080"/>
           </a:xfrm>
           <a:prstGeom prst="rect">
             <a:avLst/>
@@ -2636,7 +2636,7 @@
         <p:spPr>
           <a:xfrm>
             <a:off x="457200" y="273600"/>
-            <a:ext cx="8228880" cy="5306400"/>
+            <a:ext cx="8228520" cy="5304600"/>
           </a:xfrm>
           <a:prstGeom prst="rect">
             <a:avLst/>
@@ -2685,7 +2685,7 @@
         <p:spPr>
           <a:xfrm>
             <a:off x="457200" y="273600"/>
-            <a:ext cx="8228880" cy="1144440"/>
+            <a:ext cx="8228520" cy="1144080"/>
           </a:xfrm>
           <a:prstGeom prst="rect">
             <a:avLst/>
@@ -2712,7 +2712,7 @@
         <p:spPr>
           <a:xfrm>
             <a:off x="457200" y="1604520"/>
-            <a:ext cx="4015440" cy="1896840"/>
+            <a:ext cx="4015440" cy="1896480"/>
           </a:xfrm>
           <a:prstGeom prst="rect">
             <a:avLst/>
@@ -2737,8 +2737,8 @@
         </p:nvSpPr>
         <p:spPr>
           <a:xfrm>
-            <a:off x="457200" y="3682080"/>
-            <a:ext cx="4015440" cy="1896840"/>
+            <a:off x="457200" y="3681720"/>
+            <a:ext cx="4015440" cy="1896480"/>
           </a:xfrm>
           <a:prstGeom prst="rect">
             <a:avLst/>
@@ -2764,7 +2764,7 @@
         <p:spPr>
           <a:xfrm>
             <a:off x="4673880" y="1604520"/>
-            <a:ext cx="4015440" cy="3976920"/>
+            <a:ext cx="4015440" cy="3976560"/>
           </a:xfrm>
           <a:prstGeom prst="rect">
             <a:avLst/>
@@ -2812,7 +2812,7 @@
         <p:spPr>
           <a:xfrm>
             <a:off x="457200" y="273600"/>
-            <a:ext cx="8228880" cy="1144440"/>
+            <a:ext cx="8228520" cy="1144080"/>
           </a:xfrm>
           <a:prstGeom prst="rect">
             <a:avLst/>
@@ -2839,7 +2839,7 @@
         <p:spPr>
           <a:xfrm>
             <a:off x="457200" y="1604520"/>
-            <a:ext cx="4015440" cy="3976920"/>
+            <a:ext cx="4015440" cy="3976560"/>
           </a:xfrm>
           <a:prstGeom prst="rect">
             <a:avLst/>
@@ -2865,7 +2865,7 @@
         <p:spPr>
           <a:xfrm>
             <a:off x="4673880" y="1604520"/>
-            <a:ext cx="4015440" cy="1896840"/>
+            <a:ext cx="4015440" cy="1896480"/>
           </a:xfrm>
           <a:prstGeom prst="rect">
             <a:avLst/>
@@ -2890,8 +2890,8 @@
         </p:nvSpPr>
         <p:spPr>
           <a:xfrm>
-            <a:off x="4673880" y="3682080"/>
-            <a:ext cx="4015440" cy="1896840"/>
+            <a:off x="4673880" y="3681720"/>
+            <a:ext cx="4015440" cy="1896480"/>
           </a:xfrm>
           <a:prstGeom prst="rect">
             <a:avLst/>
@@ -2939,7 +2939,7 @@
         <p:spPr>
           <a:xfrm>
             <a:off x="457200" y="273600"/>
-            <a:ext cx="8228880" cy="1144440"/>
+            <a:ext cx="8228520" cy="1144080"/>
           </a:xfrm>
           <a:prstGeom prst="rect">
             <a:avLst/>
@@ -2966,7 +2966,7 @@
         <p:spPr>
           <a:xfrm>
             <a:off x="457200" y="1604520"/>
-            <a:ext cx="4015440" cy="1896840"/>
+            <a:ext cx="4015440" cy="1896480"/>
           </a:xfrm>
           <a:prstGeom prst="rect">
             <a:avLst/>
@@ -2992,7 +2992,7 @@
         <p:spPr>
           <a:xfrm>
             <a:off x="4673880" y="1604520"/>
-            <a:ext cx="4015440" cy="1896840"/>
+            <a:ext cx="4015440" cy="1896480"/>
           </a:xfrm>
           <a:prstGeom prst="rect">
             <a:avLst/>
@@ -3017,8 +3017,8 @@
         </p:nvSpPr>
         <p:spPr>
           <a:xfrm>
-            <a:off x="457200" y="3682080"/>
-            <a:ext cx="8228880" cy="1896840"/>
+            <a:off x="457200" y="3681720"/>
+            <a:ext cx="8228520" cy="1896480"/>
           </a:xfrm>
           <a:prstGeom prst="rect">
             <a:avLst/>
@@ -3072,7 +3072,7 @@
         <p:spPr>
           <a:xfrm>
             <a:off x="777240" y="0"/>
-            <a:ext cx="7541280" cy="378360"/>
+            <a:ext cx="7540920" cy="378000"/>
           </a:xfrm>
           <a:prstGeom prst="rect">
             <a:avLst/>
@@ -3105,7 +3105,7 @@
         <p:spPr>
           <a:xfrm>
             <a:off x="777240" y="6172200"/>
-            <a:ext cx="7541280" cy="24840"/>
+            <a:ext cx="7540920" cy="24480"/>
           </a:xfrm>
           <a:prstGeom prst="rect">
             <a:avLst/>
@@ -3339,7 +3339,7 @@
         <p:spPr>
           <a:xfrm>
             <a:off x="777240" y="0"/>
-            <a:ext cx="7541280" cy="378360"/>
+            <a:ext cx="7540920" cy="378000"/>
           </a:xfrm>
           <a:prstGeom prst="rect">
             <a:avLst/>
@@ -3372,7 +3372,7 @@
         <p:spPr>
           <a:xfrm>
             <a:off x="777240" y="6172200"/>
-            <a:ext cx="7541280" cy="24840"/>
+            <a:ext cx="7540920" cy="24480"/>
           </a:xfrm>
           <a:prstGeom prst="rect">
             <a:avLst/>
@@ -3409,7 +3409,7 @@
         <p:spPr>
           <a:xfrm>
             <a:off x="457200" y="273600"/>
-            <a:ext cx="8228880" cy="1144440"/>
+            <a:ext cx="8228520" cy="1144080"/>
           </a:xfrm>
           <a:prstGeom prst="rect">
             <a:avLst/>
@@ -3426,33 +3426,6 @@
       <p:sp>
         <p:nvSpPr>
           <p:cNvPr id="41" name="PlaceHolder 4"/>
-          <p:cNvSpPr>
-            <a:spLocks noGrp="1"/>
-          </p:cNvSpPr>
-          <p:nvPr>
-            <p:ph type="subTitle"/>
-          </p:nvPr>
-        </p:nvSpPr>
-        <p:spPr>
-          <a:xfrm>
-            <a:off x="457200" y="1604520"/>
-            <a:ext cx="8228880" cy="3976920"/>
-          </a:xfrm>
-          <a:prstGeom prst="rect">
-            <a:avLst/>
-          </a:prstGeom>
-        </p:spPr>
-        <p:txBody>
-          <a:bodyPr lIns="0" rIns="0" tIns="0" bIns="0" anchor="ctr"/>
-          <a:p>
-            <a:pPr algn="ctr"/>
-            <a:endParaRPr/>
-          </a:p>
-        </p:txBody>
-      </p:sp>
-      <p:sp>
-        <p:nvSpPr>
-          <p:cNvPr id="42" name="PlaceHolder 5"/>
           <p:cNvSpPr>
             <a:spLocks noGrp="1"/>
           </p:cNvSpPr>
@@ -3463,7 +3436,7 @@
         <p:spPr>
           <a:xfrm>
             <a:off x="457200" y="1604520"/>
-            <a:ext cx="8229240" cy="3977280"/>
+            <a:ext cx="8228520" cy="3976560"/>
           </a:xfrm>
           <a:prstGeom prst="rect">
             <a:avLst/>
@@ -3478,7 +3451,7 @@
               <a:buChar char=""/>
             </a:pPr>
             <a:r>
-              <a:rPr lang="es-MX" sz="3200">
+              <a:rPr lang="es-MX">
                 <a:latin typeface="Arial"/>
               </a:rPr>
               <a:t>Click to edit the outline text format</a:t>
@@ -3492,7 +3465,7 @@
               <a:buChar char=""/>
             </a:pPr>
             <a:r>
-              <a:rPr lang="es-MX" sz="2800">
+              <a:rPr lang="es-MX">
                 <a:latin typeface="Arial"/>
               </a:rPr>
               <a:t>Second Outline Level</a:t>
@@ -3506,7 +3479,7 @@
               <a:buChar char=""/>
             </a:pPr>
             <a:r>
-              <a:rPr lang="es-MX" sz="2400">
+              <a:rPr lang="es-MX">
                 <a:latin typeface="Arial"/>
               </a:rPr>
               <a:t>Third Outline Level</a:t>
@@ -3520,7 +3493,7 @@
               <a:buChar char=""/>
             </a:pPr>
             <a:r>
-              <a:rPr lang="es-MX" sz="2000">
+              <a:rPr lang="es-MX">
                 <a:latin typeface="Arial"/>
               </a:rPr>
               <a:t>Fourth Outline Level</a:t>
@@ -3534,7 +3507,7 @@
               <a:buChar char=""/>
             </a:pPr>
             <a:r>
-              <a:rPr lang="es-MX" sz="2000">
+              <a:rPr lang="es-MX">
                 <a:latin typeface="Arial"/>
               </a:rPr>
               <a:t>Fifth Outline Level</a:t>
@@ -3548,7 +3521,7 @@
               <a:buChar char=""/>
             </a:pPr>
             <a:r>
-              <a:rPr lang="es-MX" sz="2000">
+              <a:rPr lang="es-MX">
                 <a:latin typeface="Arial"/>
               </a:rPr>
               <a:t>Sixth Outline Level</a:t>
@@ -3562,7 +3535,7 @@
               <a:buChar char=""/>
             </a:pPr>
             <a:r>
-              <a:rPr lang="es-MX" sz="2000">
+              <a:rPr lang="es-MX">
                 <a:latin typeface="Arial"/>
               </a:rPr>
               <a:t>Seventh Outline Level</a:t>
@@ -3610,14 +3583,14 @@
       </p:grpSpPr>
       <p:sp>
         <p:nvSpPr>
-          <p:cNvPr id="77" name="CustomShape 1"/>
+          <p:cNvPr id="76" name="CustomShape 1"/>
           <p:cNvSpPr/>
           <p:nvPr/>
         </p:nvSpPr>
         <p:spPr>
           <a:xfrm>
             <a:off x="1012680" y="2282760"/>
-            <a:ext cx="7768440" cy="1465920"/>
+            <a:ext cx="7768080" cy="1465560"/>
           </a:xfrm>
           <a:prstGeom prst="rect">
             <a:avLst/>
@@ -3636,14 +3609,14 @@
       </p:sp>
       <p:sp>
         <p:nvSpPr>
-          <p:cNvPr id="78" name="CustomShape 2"/>
+          <p:cNvPr id="77" name="CustomShape 2"/>
           <p:cNvSpPr/>
           <p:nvPr/>
         </p:nvSpPr>
         <p:spPr>
           <a:xfrm>
             <a:off x="457200" y="501840"/>
-            <a:ext cx="8030160" cy="1141560"/>
+            <a:ext cx="8029800" cy="1141200"/>
           </a:xfrm>
           <a:prstGeom prst="rect">
             <a:avLst/>
@@ -3683,14 +3656,14 @@
       </p:sp>
       <p:sp>
         <p:nvSpPr>
-          <p:cNvPr id="79" name="CustomShape 3"/>
+          <p:cNvPr id="78" name="CustomShape 3"/>
           <p:cNvSpPr/>
           <p:nvPr/>
         </p:nvSpPr>
         <p:spPr>
           <a:xfrm>
             <a:off x="457200" y="1604520"/>
-            <a:ext cx="3922920" cy="3974040"/>
+            <a:ext cx="3922560" cy="3973680"/>
           </a:xfrm>
           <a:prstGeom prst="rect">
             <a:avLst/>
@@ -3794,7 +3767,7 @@
       </p:sp>
       <p:pic>
         <p:nvPicPr>
-          <p:cNvPr id="80" name="Picture 2" descr=""/>
+          <p:cNvPr id="79" name="Picture 2" descr=""/>
           <p:cNvPicPr/>
           <p:nvPr/>
         </p:nvPicPr>
@@ -3805,7 +3778,7 @@
         <p:spPr>
           <a:xfrm>
             <a:off x="6948360" y="1196640"/>
-            <a:ext cx="1911960" cy="1892880"/>
+            <a:ext cx="1911600" cy="1892520"/>
           </a:xfrm>
           <a:prstGeom prst="rect">
             <a:avLst/>
@@ -3876,14 +3849,14 @@
       </p:grpSpPr>
       <p:sp>
         <p:nvSpPr>
-          <p:cNvPr id="108" name="CustomShape 1"/>
+          <p:cNvPr id="107" name="CustomShape 1"/>
           <p:cNvSpPr/>
           <p:nvPr/>
         </p:nvSpPr>
         <p:spPr>
           <a:xfrm>
             <a:off x="457200" y="274680"/>
-            <a:ext cx="8225640" cy="1139040"/>
+            <a:ext cx="8225280" cy="1138680"/>
           </a:xfrm>
           <a:prstGeom prst="rect">
             <a:avLst/>
@@ -3923,14 +3896,14 @@
       </p:sp>
       <p:sp>
         <p:nvSpPr>
-          <p:cNvPr id="109" name="CustomShape 2"/>
+          <p:cNvPr id="108" name="CustomShape 2"/>
           <p:cNvSpPr/>
           <p:nvPr/>
         </p:nvSpPr>
         <p:spPr>
           <a:xfrm>
             <a:off x="457200" y="1600200"/>
-            <a:ext cx="8225640" cy="4521960"/>
+            <a:ext cx="8225280" cy="4521600"/>
           </a:xfrm>
           <a:prstGeom prst="rect">
             <a:avLst/>
@@ -3949,14 +3922,14 @@
       </p:sp>
       <p:sp>
         <p:nvSpPr>
-          <p:cNvPr id="110" name="CustomShape 3"/>
+          <p:cNvPr id="109" name="CustomShape 3"/>
           <p:cNvSpPr/>
           <p:nvPr/>
         </p:nvSpPr>
         <p:spPr>
           <a:xfrm>
             <a:off x="163080" y="1113480"/>
-            <a:ext cx="8763480" cy="2557080"/>
+            <a:ext cx="8763120" cy="2556720"/>
           </a:xfrm>
           <a:prstGeom prst="rect">
             <a:avLst/>
@@ -4004,7 +3977,7 @@
       </p:sp>
       <p:pic>
         <p:nvPicPr>
-          <p:cNvPr id="111" name="" descr=""/>
+          <p:cNvPr id="110" name="" descr=""/>
           <p:cNvPicPr/>
           <p:nvPr/>
         </p:nvPicPr>
@@ -4015,7 +3988,7 @@
         <p:spPr>
           <a:xfrm>
             <a:off x="8280" y="3214440"/>
-            <a:ext cx="9143280" cy="2689200"/>
+            <a:ext cx="9142920" cy="2688840"/>
           </a:xfrm>
           <a:prstGeom prst="rect">
             <a:avLst/>
@@ -4086,14 +4059,14 @@
       </p:grpSpPr>
       <p:sp>
         <p:nvSpPr>
-          <p:cNvPr id="112" name="CustomShape 1"/>
+          <p:cNvPr id="111" name="CustomShape 1"/>
           <p:cNvSpPr/>
           <p:nvPr/>
         </p:nvSpPr>
         <p:spPr>
           <a:xfrm>
             <a:off x="457200" y="274680"/>
-            <a:ext cx="8225640" cy="1139040"/>
+            <a:ext cx="8225280" cy="1138680"/>
           </a:xfrm>
           <a:prstGeom prst="rect">
             <a:avLst/>
@@ -4133,14 +4106,14 @@
       </p:sp>
       <p:sp>
         <p:nvSpPr>
-          <p:cNvPr id="113" name="CustomShape 2"/>
+          <p:cNvPr id="112" name="CustomShape 2"/>
           <p:cNvSpPr/>
           <p:nvPr/>
         </p:nvSpPr>
         <p:spPr>
           <a:xfrm>
             <a:off x="457200" y="1600200"/>
-            <a:ext cx="8225640" cy="4521960"/>
+            <a:ext cx="8225280" cy="4521600"/>
           </a:xfrm>
           <a:prstGeom prst="rect">
             <a:avLst/>
@@ -4159,14 +4132,14 @@
       </p:sp>
       <p:sp>
         <p:nvSpPr>
-          <p:cNvPr id="114" name="CustomShape 3"/>
+          <p:cNvPr id="113" name="CustomShape 3"/>
           <p:cNvSpPr/>
           <p:nvPr/>
         </p:nvSpPr>
         <p:spPr>
           <a:xfrm>
             <a:off x="6890760" y="1124640"/>
-            <a:ext cx="1851480" cy="3380040"/>
+            <a:ext cx="1851120" cy="3379680"/>
           </a:xfrm>
           <a:prstGeom prst="rect">
             <a:avLst/>
@@ -4214,13 +4187,13 @@
       </p:sp>
       <p:graphicFrame>
         <p:nvGraphicFramePr>
-          <p:cNvPr id="115" name="Table 4"/>
+          <p:cNvPr id="114" name="Table 4"/>
           <p:cNvGraphicFramePr/>
           <p:nvPr/>
         </p:nvGraphicFramePr>
         <p:xfrm>
           <a:off x="217800" y="1127520"/>
-          <a:ext cx="5651640" cy="349560"/>
+          <a:ext cx="6351120" cy="2926440"/>
         </p:xfrm>
         <a:graphic>
           <a:graphicData uri="http://schemas.openxmlformats.org/drawingml/2006/table">
@@ -4486,7 +4459,7 @@
                   <a:tcPr/>
                 </a:tc>
               </a:tr>
-              <a:tr h="859680">
+              <a:tr h="859320">
                 <a:tc>
                   <a:txBody>
                     <a:bodyPr/>
@@ -4575,13 +4548,13 @@
       </p:graphicFrame>
       <p:graphicFrame>
         <p:nvGraphicFramePr>
-          <p:cNvPr id="116" name="Table 5"/>
+          <p:cNvPr id="115" name="Table 5"/>
           <p:cNvGraphicFramePr/>
           <p:nvPr/>
         </p:nvGraphicFramePr>
         <p:xfrm>
           <a:off x="582480" y="4300920"/>
-          <a:ext cx="5753160" cy="343080"/>
+          <a:ext cx="5753160" cy="1638720"/>
         </p:xfrm>
         <a:graphic>
           <a:graphicData uri="http://schemas.openxmlformats.org/drawingml/2006/table">
@@ -4837,14 +4810,14 @@
       </p:grpSpPr>
       <p:sp>
         <p:nvSpPr>
-          <p:cNvPr id="117" name="CustomShape 1"/>
+          <p:cNvPr id="116" name="CustomShape 1"/>
           <p:cNvSpPr/>
           <p:nvPr/>
         </p:nvSpPr>
         <p:spPr>
           <a:xfrm>
             <a:off x="457200" y="274680"/>
-            <a:ext cx="8225640" cy="1139040"/>
+            <a:ext cx="8225280" cy="1138680"/>
           </a:xfrm>
           <a:prstGeom prst="rect">
             <a:avLst/>
@@ -4884,14 +4857,14 @@
       </p:sp>
       <p:sp>
         <p:nvSpPr>
-          <p:cNvPr id="118" name="CustomShape 2"/>
+          <p:cNvPr id="117" name="CustomShape 2"/>
           <p:cNvSpPr/>
           <p:nvPr/>
         </p:nvSpPr>
         <p:spPr>
           <a:xfrm>
             <a:off x="457200" y="1600200"/>
-            <a:ext cx="8225640" cy="4521960"/>
+            <a:ext cx="8225280" cy="4521600"/>
           </a:xfrm>
           <a:prstGeom prst="rect">
             <a:avLst/>
@@ -4910,14 +4883,14 @@
       </p:sp>
       <p:sp>
         <p:nvSpPr>
-          <p:cNvPr id="119" name="CustomShape 3"/>
+          <p:cNvPr id="118" name="CustomShape 3"/>
           <p:cNvSpPr/>
           <p:nvPr/>
         </p:nvSpPr>
         <p:spPr>
           <a:xfrm>
             <a:off x="5751360" y="1412640"/>
-            <a:ext cx="2931480" cy="2282760"/>
+            <a:ext cx="2931120" cy="2282400"/>
           </a:xfrm>
           <a:prstGeom prst="rect">
             <a:avLst/>
@@ -4965,13 +4938,13 @@
       </p:sp>
       <p:graphicFrame>
         <p:nvGraphicFramePr>
-          <p:cNvPr id="120" name=""/>
+          <p:cNvPr id="119" name=""/>
           <p:cNvGraphicFramePr/>
           <p:nvPr/>
         </p:nvGraphicFramePr>
         <p:xfrm>
           <a:off x="720000" y="1576800"/>
-          <a:ext cx="4917600" cy="2742840"/>
+          <a:ext cx="4917240" cy="2742480"/>
         </p:xfrm>
         <a:graphic>
           <a:graphicData uri="http://schemas.openxmlformats.org/drawingml/2006/chart">
@@ -5040,14 +5013,14 @@
       </p:grpSpPr>
       <p:sp>
         <p:nvSpPr>
-          <p:cNvPr id="121" name="CustomShape 1"/>
+          <p:cNvPr id="120" name="CustomShape 1"/>
           <p:cNvSpPr/>
           <p:nvPr/>
         </p:nvSpPr>
         <p:spPr>
           <a:xfrm>
             <a:off x="457200" y="273600"/>
-            <a:ext cx="8228880" cy="1144440"/>
+            <a:ext cx="8228520" cy="1144080"/>
           </a:xfrm>
           <a:prstGeom prst="rect">
             <a:avLst/>
@@ -5073,7 +5046,11 @@
             </a:pPr>
             <a:r>
               <a:rPr lang="es-MX" sz="4400" strike="noStrike">
+                <a:solidFill>
+                  <a:srgbClr val="000000"/>
+                </a:solidFill>
                 <a:latin typeface="Arial"/>
+                <a:ea typeface="DejaVu Sans"/>
               </a:rPr>
               <a:t>Respaldos</a:t>
             </a:r>
@@ -5083,13 +5060,13 @@
       </p:sp>
       <p:graphicFrame>
         <p:nvGraphicFramePr>
-          <p:cNvPr id="122" name="Table 2"/>
+          <p:cNvPr id="121" name="Table 2"/>
           <p:cNvGraphicFramePr/>
           <p:nvPr/>
         </p:nvGraphicFramePr>
         <p:xfrm>
           <a:off x="3007800" y="1833840"/>
-          <a:ext cx="3382920" cy="680040"/>
+          <a:ext cx="3382920" cy="695160"/>
         </p:xfrm>
         <a:graphic>
           <a:graphicData uri="http://schemas.openxmlformats.org/drawingml/2006/table">
@@ -5169,14 +5146,14 @@
       </p:graphicFrame>
       <p:sp>
         <p:nvSpPr>
-          <p:cNvPr id="123" name="CustomShape 3"/>
+          <p:cNvPr id="122" name="CustomShape 3"/>
           <p:cNvSpPr/>
           <p:nvPr/>
         </p:nvSpPr>
         <p:spPr>
           <a:xfrm>
             <a:off x="1152000" y="3960000"/>
-            <a:ext cx="3095640" cy="601920"/>
+            <a:ext cx="3095280" cy="601560"/>
           </a:xfrm>
           <a:prstGeom prst="rect">
             <a:avLst/>
@@ -5197,7 +5174,11 @@
           <a:p>
             <a:r>
               <a:rPr lang="es-MX" strike="noStrike">
+                <a:solidFill>
+                  <a:srgbClr val="000000"/>
+                </a:solidFill>
                 <a:latin typeface="Arial"/>
+                <a:ea typeface="DejaVu Sans"/>
               </a:rPr>
               <a:t>Respaldos realizados el día 11 sin ningún problema.</a:t>
             </a:r>
@@ -5256,14 +5237,14 @@
       </p:grpSpPr>
       <p:sp>
         <p:nvSpPr>
-          <p:cNvPr id="81" name="CustomShape 1"/>
+          <p:cNvPr id="80" name="CustomShape 1"/>
           <p:cNvSpPr/>
           <p:nvPr/>
         </p:nvSpPr>
         <p:spPr>
           <a:xfrm>
             <a:off x="432000" y="12600"/>
-            <a:ext cx="8225640" cy="1139040"/>
+            <a:ext cx="8225280" cy="1138680"/>
           </a:xfrm>
           <a:prstGeom prst="rect">
             <a:avLst/>
@@ -5303,14 +5284,14 @@
       </p:sp>
       <p:sp>
         <p:nvSpPr>
-          <p:cNvPr id="82" name="CustomShape 2"/>
+          <p:cNvPr id="81" name="CustomShape 2"/>
           <p:cNvSpPr/>
           <p:nvPr/>
         </p:nvSpPr>
         <p:spPr>
           <a:xfrm>
             <a:off x="457200" y="1600200"/>
-            <a:ext cx="8225640" cy="4521960"/>
+            <a:ext cx="8225280" cy="4521600"/>
           </a:xfrm>
           <a:prstGeom prst="rect">
             <a:avLst/>
@@ -5329,13 +5310,13 @@
       </p:sp>
       <p:graphicFrame>
         <p:nvGraphicFramePr>
-          <p:cNvPr id="83" name="Table 3"/>
+          <p:cNvPr id="82" name="Table 3"/>
           <p:cNvGraphicFramePr/>
           <p:nvPr/>
         </p:nvGraphicFramePr>
         <p:xfrm>
           <a:off x="1522080" y="830160"/>
-          <a:ext cx="6093720" cy="4421880"/>
+          <a:ext cx="6093720" cy="4879440"/>
         </p:xfrm>
         <a:graphic>
           <a:graphicData uri="http://schemas.openxmlformats.org/drawingml/2006/table">
@@ -6057,14 +6038,14 @@
       </p:grpSpPr>
       <p:sp>
         <p:nvSpPr>
-          <p:cNvPr id="84" name="CustomShape 1"/>
+          <p:cNvPr id="83" name="CustomShape 1"/>
           <p:cNvSpPr/>
           <p:nvPr/>
         </p:nvSpPr>
         <p:spPr>
           <a:xfrm>
             <a:off x="457200" y="274680"/>
-            <a:ext cx="8225640" cy="1139040"/>
+            <a:ext cx="8225280" cy="1138680"/>
           </a:xfrm>
           <a:prstGeom prst="rect">
             <a:avLst/>
@@ -6104,14 +6085,14 @@
       </p:sp>
       <p:sp>
         <p:nvSpPr>
-          <p:cNvPr id="85" name="CustomShape 2"/>
+          <p:cNvPr id="84" name="CustomShape 2"/>
           <p:cNvSpPr/>
           <p:nvPr/>
         </p:nvSpPr>
         <p:spPr>
           <a:xfrm>
             <a:off x="457200" y="1600200"/>
-            <a:ext cx="8225640" cy="4521960"/>
+            <a:ext cx="8225280" cy="4521600"/>
           </a:xfrm>
           <a:prstGeom prst="rect">
             <a:avLst/>
@@ -6149,13 +6130,13 @@
       </p:sp>
       <p:graphicFrame>
         <p:nvGraphicFramePr>
-          <p:cNvPr id="86" name="Table 3"/>
+          <p:cNvPr id="85" name="Table 3"/>
           <p:cNvGraphicFramePr/>
           <p:nvPr/>
         </p:nvGraphicFramePr>
         <p:xfrm>
           <a:off x="36360" y="1579680"/>
-          <a:ext cx="9078120" cy="4463640"/>
+          <a:ext cx="9078120" cy="4463280"/>
         </p:xfrm>
         <a:graphic>
           <a:graphicData uri="http://schemas.openxmlformats.org/drawingml/2006/table">
@@ -6718,7 +6699,7 @@
                   <a:tcPr/>
                 </a:tc>
               </a:tr>
-              <a:tr h="614520">
+              <a:tr h="614160">
                 <a:tc>
                   <a:txBody>
                     <a:bodyPr/>
@@ -6860,14 +6841,14 @@
       </p:grpSpPr>
       <p:sp>
         <p:nvSpPr>
-          <p:cNvPr id="87" name="CustomShape 1"/>
+          <p:cNvPr id="86" name="CustomShape 1"/>
           <p:cNvSpPr/>
           <p:nvPr/>
         </p:nvSpPr>
         <p:spPr>
           <a:xfrm>
             <a:off x="576000" y="1080000"/>
-            <a:ext cx="7990560" cy="600840"/>
+            <a:ext cx="7990200" cy="600480"/>
           </a:xfrm>
           <a:prstGeom prst="rect">
             <a:avLst/>
@@ -6951,14 +6932,14 @@
       </p:grpSpPr>
       <p:sp>
         <p:nvSpPr>
-          <p:cNvPr id="88" name="CustomShape 1"/>
+          <p:cNvPr id="87" name="CustomShape 1"/>
           <p:cNvSpPr/>
           <p:nvPr/>
         </p:nvSpPr>
         <p:spPr>
           <a:xfrm>
             <a:off x="457200" y="274680"/>
-            <a:ext cx="8225640" cy="1139040"/>
+            <a:ext cx="8225280" cy="1138680"/>
           </a:xfrm>
           <a:prstGeom prst="rect">
             <a:avLst/>
@@ -6998,14 +6979,14 @@
       </p:sp>
       <p:sp>
         <p:nvSpPr>
-          <p:cNvPr id="89" name="CustomShape 2"/>
+          <p:cNvPr id="88" name="CustomShape 2"/>
           <p:cNvSpPr/>
           <p:nvPr/>
         </p:nvSpPr>
         <p:spPr>
           <a:xfrm>
             <a:off x="457200" y="1600200"/>
-            <a:ext cx="8225640" cy="4521960"/>
+            <a:ext cx="8225280" cy="4521600"/>
           </a:xfrm>
           <a:prstGeom prst="rect">
             <a:avLst/>
@@ -7024,14 +7005,14 @@
       </p:sp>
       <p:sp>
         <p:nvSpPr>
-          <p:cNvPr id="90" name="CustomShape 3"/>
+          <p:cNvPr id="89" name="CustomShape 3"/>
           <p:cNvSpPr/>
           <p:nvPr/>
         </p:nvSpPr>
         <p:spPr>
           <a:xfrm>
             <a:off x="792000" y="3990240"/>
-            <a:ext cx="7989840" cy="2282760"/>
+            <a:ext cx="7989480" cy="2282400"/>
           </a:xfrm>
           <a:prstGeom prst="rect">
             <a:avLst/>
@@ -7095,13 +7076,13 @@
       </p:sp>
       <p:graphicFrame>
         <p:nvGraphicFramePr>
-          <p:cNvPr id="91" name="Table 4"/>
+          <p:cNvPr id="90" name="Table 4"/>
           <p:cNvGraphicFramePr/>
           <p:nvPr/>
         </p:nvGraphicFramePr>
         <p:xfrm>
           <a:off x="569880" y="1117800"/>
-          <a:ext cx="8286120" cy="2689920"/>
+          <a:ext cx="8285760" cy="2689920"/>
         </p:xfrm>
         <a:graphic>
           <a:graphicData uri="http://schemas.openxmlformats.org/drawingml/2006/table">
@@ -7794,14 +7775,14 @@
       </p:grpSpPr>
       <p:sp>
         <p:nvSpPr>
-          <p:cNvPr id="92" name="CustomShape 1"/>
+          <p:cNvPr id="91" name="CustomShape 1"/>
           <p:cNvSpPr/>
           <p:nvPr/>
         </p:nvSpPr>
         <p:spPr>
           <a:xfrm>
             <a:off x="457200" y="274680"/>
-            <a:ext cx="8225640" cy="1139040"/>
+            <a:ext cx="8225280" cy="1138680"/>
           </a:xfrm>
           <a:prstGeom prst="rect">
             <a:avLst/>
@@ -7841,14 +7822,14 @@
       </p:sp>
       <p:sp>
         <p:nvSpPr>
-          <p:cNvPr id="93" name="CustomShape 2"/>
+          <p:cNvPr id="92" name="CustomShape 2"/>
           <p:cNvSpPr/>
           <p:nvPr/>
         </p:nvSpPr>
         <p:spPr>
           <a:xfrm>
             <a:off x="457200" y="1600200"/>
-            <a:ext cx="8225640" cy="4521960"/>
+            <a:ext cx="8225280" cy="4521600"/>
           </a:xfrm>
           <a:prstGeom prst="rect">
             <a:avLst/>
@@ -7867,14 +7848,14 @@
       </p:sp>
       <p:sp>
         <p:nvSpPr>
-          <p:cNvPr id="94" name="CustomShape 3"/>
+          <p:cNvPr id="93" name="CustomShape 3"/>
           <p:cNvSpPr/>
           <p:nvPr/>
         </p:nvSpPr>
         <p:spPr>
           <a:xfrm>
             <a:off x="864000" y="4388040"/>
-            <a:ext cx="5976000" cy="1734120"/>
+            <a:ext cx="5975640" cy="1733760"/>
           </a:xfrm>
           <a:prstGeom prst="rect">
             <a:avLst/>
@@ -7914,13 +7895,13 @@
       </p:sp>
       <p:graphicFrame>
         <p:nvGraphicFramePr>
-          <p:cNvPr id="95" name="Table 4"/>
+          <p:cNvPr id="94" name="Table 4"/>
           <p:cNvGraphicFramePr/>
           <p:nvPr/>
         </p:nvGraphicFramePr>
         <p:xfrm>
           <a:off x="160920" y="1185120"/>
-          <a:ext cx="8521920" cy="2689920"/>
+          <a:ext cx="8521560" cy="2689920"/>
         </p:xfrm>
         <a:graphic>
           <a:graphicData uri="http://schemas.openxmlformats.org/drawingml/2006/table">
@@ -8526,14 +8507,14 @@
       </p:grpSpPr>
       <p:sp>
         <p:nvSpPr>
-          <p:cNvPr id="96" name="CustomShape 1"/>
+          <p:cNvPr id="95" name="CustomShape 1"/>
           <p:cNvSpPr/>
           <p:nvPr/>
         </p:nvSpPr>
         <p:spPr>
           <a:xfrm>
             <a:off x="457200" y="274680"/>
-            <a:ext cx="8225640" cy="1139040"/>
+            <a:ext cx="8225280" cy="1138680"/>
           </a:xfrm>
           <a:prstGeom prst="rect">
             <a:avLst/>
@@ -8573,14 +8554,14 @@
       </p:sp>
       <p:sp>
         <p:nvSpPr>
-          <p:cNvPr id="97" name="CustomShape 2"/>
+          <p:cNvPr id="96" name="CustomShape 2"/>
           <p:cNvSpPr/>
           <p:nvPr/>
         </p:nvSpPr>
         <p:spPr>
           <a:xfrm>
             <a:off x="457200" y="1600200"/>
-            <a:ext cx="8225640" cy="4521960"/>
+            <a:ext cx="8225280" cy="4521600"/>
           </a:xfrm>
           <a:prstGeom prst="rect">
             <a:avLst/>
@@ -8599,14 +8580,14 @@
       </p:sp>
       <p:sp>
         <p:nvSpPr>
-          <p:cNvPr id="98" name="CustomShape 3"/>
+          <p:cNvPr id="97" name="CustomShape 3"/>
           <p:cNvSpPr/>
           <p:nvPr/>
         </p:nvSpPr>
         <p:spPr>
           <a:xfrm>
             <a:off x="6365160" y="1124640"/>
-            <a:ext cx="2284200" cy="3105720"/>
+            <a:ext cx="2283840" cy="3105360"/>
           </a:xfrm>
           <a:prstGeom prst="rect">
             <a:avLst/>
@@ -8654,13 +8635,13 @@
       </p:sp>
       <p:graphicFrame>
         <p:nvGraphicFramePr>
-          <p:cNvPr id="99" name=""/>
+          <p:cNvPr id="98" name=""/>
           <p:cNvGraphicFramePr/>
           <p:nvPr/>
         </p:nvGraphicFramePr>
         <p:xfrm>
           <a:off x="360000" y="1248480"/>
-          <a:ext cx="5789880" cy="2855160"/>
+          <a:ext cx="5789520" cy="2854800"/>
         </p:xfrm>
         <a:graphic>
           <a:graphicData uri="http://schemas.openxmlformats.org/drawingml/2006/chart">
@@ -8729,14 +8710,14 @@
       </p:grpSpPr>
       <p:sp>
         <p:nvSpPr>
-          <p:cNvPr id="100" name="CustomShape 1"/>
+          <p:cNvPr id="99" name="CustomShape 1"/>
           <p:cNvSpPr/>
           <p:nvPr/>
         </p:nvSpPr>
         <p:spPr>
           <a:xfrm>
             <a:off x="457200" y="274680"/>
-            <a:ext cx="8225640" cy="1139040"/>
+            <a:ext cx="8225280" cy="1138680"/>
           </a:xfrm>
           <a:prstGeom prst="rect">
             <a:avLst/>
@@ -8776,14 +8757,14 @@
       </p:sp>
       <p:sp>
         <p:nvSpPr>
-          <p:cNvPr id="101" name="CustomShape 2"/>
+          <p:cNvPr id="100" name="CustomShape 2"/>
           <p:cNvSpPr/>
           <p:nvPr/>
         </p:nvSpPr>
         <p:spPr>
           <a:xfrm>
             <a:off x="457200" y="1600200"/>
-            <a:ext cx="8225640" cy="4521960"/>
+            <a:ext cx="8225280" cy="4521600"/>
           </a:xfrm>
           <a:prstGeom prst="rect">
             <a:avLst/>
@@ -8802,14 +8783,14 @@
       </p:sp>
       <p:sp>
         <p:nvSpPr>
-          <p:cNvPr id="102" name="CustomShape 3"/>
+          <p:cNvPr id="101" name="CustomShape 3"/>
           <p:cNvSpPr/>
           <p:nvPr/>
         </p:nvSpPr>
         <p:spPr>
           <a:xfrm>
             <a:off x="6183360" y="1416240"/>
-            <a:ext cx="2499480" cy="2831400"/>
+            <a:ext cx="2499120" cy="2831040"/>
           </a:xfrm>
           <a:prstGeom prst="rect">
             <a:avLst/>
@@ -8873,13 +8854,13 @@
       </p:sp>
       <p:graphicFrame>
         <p:nvGraphicFramePr>
-          <p:cNvPr id="103" name=""/>
+          <p:cNvPr id="102" name=""/>
           <p:cNvGraphicFramePr/>
           <p:nvPr/>
         </p:nvGraphicFramePr>
         <p:xfrm>
           <a:off x="216000" y="1368000"/>
-          <a:ext cx="5858280" cy="2855160"/>
+          <a:ext cx="5857920" cy="2854800"/>
         </p:xfrm>
         <a:graphic>
           <a:graphicData uri="http://schemas.openxmlformats.org/drawingml/2006/chart">
@@ -8948,14 +8929,14 @@
       </p:grpSpPr>
       <p:sp>
         <p:nvSpPr>
-          <p:cNvPr id="104" name="CustomShape 1"/>
+          <p:cNvPr id="103" name="CustomShape 1"/>
           <p:cNvSpPr/>
           <p:nvPr/>
         </p:nvSpPr>
         <p:spPr>
           <a:xfrm>
             <a:off x="457200" y="274680"/>
-            <a:ext cx="8225640" cy="1139040"/>
+            <a:ext cx="8225280" cy="1138680"/>
           </a:xfrm>
           <a:prstGeom prst="rect">
             <a:avLst/>
@@ -8995,14 +8976,14 @@
       </p:sp>
       <p:sp>
         <p:nvSpPr>
-          <p:cNvPr id="105" name="CustomShape 2"/>
+          <p:cNvPr id="104" name="CustomShape 2"/>
           <p:cNvSpPr/>
           <p:nvPr/>
         </p:nvSpPr>
         <p:spPr>
           <a:xfrm>
             <a:off x="457200" y="1600200"/>
-            <a:ext cx="8225640" cy="4521960"/>
+            <a:ext cx="8225280" cy="4521600"/>
           </a:xfrm>
           <a:prstGeom prst="rect">
             <a:avLst/>
@@ -9021,14 +9002,14 @@
       </p:sp>
       <p:sp>
         <p:nvSpPr>
-          <p:cNvPr id="106" name="CustomShape 3"/>
+          <p:cNvPr id="105" name="CustomShape 3"/>
           <p:cNvSpPr/>
           <p:nvPr/>
         </p:nvSpPr>
         <p:spPr>
           <a:xfrm>
             <a:off x="6647040" y="1357920"/>
-            <a:ext cx="2284200" cy="3105720"/>
+            <a:ext cx="2283840" cy="3105360"/>
           </a:xfrm>
           <a:prstGeom prst="rect">
             <a:avLst/>
@@ -9076,13 +9057,13 @@
       </p:sp>
       <p:graphicFrame>
         <p:nvGraphicFramePr>
-          <p:cNvPr id="107" name=""/>
+          <p:cNvPr id="106" name=""/>
           <p:cNvGraphicFramePr/>
           <p:nvPr/>
         </p:nvGraphicFramePr>
         <p:xfrm>
           <a:off x="0" y="1320120"/>
-          <a:ext cx="6646680" cy="2855520"/>
+          <a:ext cx="6646320" cy="2855160"/>
         </p:xfrm>
         <a:graphic>
           <a:graphicData uri="http://schemas.openxmlformats.org/drawingml/2006/chart">

</xml_diff>